<commit_message>
Aula Anatomia - Fundamentos - Two Way Binding
</commit_message>
<xml_diff>
--- a/presentations/anatomia-fundamentos/two-way-binding.pptx
+++ b/presentations/anatomia-fundamentos/two-way-binding.pptx
@@ -9,15 +9,22 @@
     <p:sldMasterId id="2147483764" r:id="rId8"/>
   </p:sldMasterIdLst>
   <p:notesMasterIdLst>
-    <p:notesMasterId r:id="rId15"/>
+    <p:notesMasterId r:id="rId22"/>
   </p:notesMasterIdLst>
   <p:sldIdLst>
     <p:sldId id="256" r:id="rId9"/>
     <p:sldId id="258" r:id="rId10"/>
     <p:sldId id="281" r:id="rId11"/>
     <p:sldId id="330" r:id="rId12"/>
-    <p:sldId id="338" r:id="rId13"/>
-    <p:sldId id="272" r:id="rId14"/>
+    <p:sldId id="339" r:id="rId13"/>
+    <p:sldId id="340" r:id="rId14"/>
+    <p:sldId id="341" r:id="rId15"/>
+    <p:sldId id="342" r:id="rId16"/>
+    <p:sldId id="343" r:id="rId17"/>
+    <p:sldId id="344" r:id="rId18"/>
+    <p:sldId id="345" r:id="rId19"/>
+    <p:sldId id="338" r:id="rId20"/>
+    <p:sldId id="272" r:id="rId21"/>
   </p:sldIdLst>
   <p:sldSz cx="12192000" cy="6858000"/>
   <p:notesSz cx="6858000" cy="9144000"/>
@@ -129,6 +136,13 @@
           <p14:sldIdLst>
             <p14:sldId id="281"/>
             <p14:sldId id="330"/>
+            <p14:sldId id="339"/>
+            <p14:sldId id="340"/>
+            <p14:sldId id="341"/>
+            <p14:sldId id="342"/>
+            <p14:sldId id="343"/>
+            <p14:sldId id="344"/>
+            <p14:sldId id="345"/>
             <p14:sldId id="338"/>
           </p14:sldIdLst>
         </p14:section>
@@ -243,7 +257,7 @@
           <a:p>
             <a:fld id="{1A323134-CEB1-9C43-B6DE-74B10BFB1C0A}" type="datetimeFigureOut">
               <a:rPr lang="en-US" smtClean="0"/>
-              <a:t>4/9/2018</a:t>
+              <a:t>4/10/2018</a:t>
             </a:fld>
             <a:endParaRPr lang="en-US"/>
           </a:p>
@@ -7548,6 +7562,837 @@
 </p:sld>
 </file>
 
+<file path=ppt/slides/slide10.xml><?xml version="1.0" encoding="utf-8"?>
+<p:sld xmlns:a="http://schemas.openxmlformats.org/drawingml/2006/main" xmlns:r="http://schemas.openxmlformats.org/officeDocument/2006/relationships" xmlns:p="http://schemas.openxmlformats.org/presentationml/2006/main">
+  <p:cSld>
+    <p:spTree>
+      <p:nvGrpSpPr>
+        <p:cNvPr id="1" name=""/>
+        <p:cNvGrpSpPr/>
+        <p:nvPr/>
+      </p:nvGrpSpPr>
+      <p:grpSpPr>
+        <a:xfrm>
+          <a:off x="0" y="0"/>
+          <a:ext cx="0" cy="0"/>
+          <a:chOff x="0" y="0"/>
+          <a:chExt cx="0" cy="0"/>
+        </a:xfrm>
+      </p:grpSpPr>
+      <p:sp>
+        <p:nvSpPr>
+          <p:cNvPr id="2" name="Slide Number Placeholder 1"/>
+          <p:cNvSpPr>
+            <a:spLocks noGrp="1"/>
+          </p:cNvSpPr>
+          <p:nvPr>
+            <p:ph type="sldNum" sz="quarter" idx="12"/>
+          </p:nvPr>
+        </p:nvSpPr>
+        <p:spPr/>
+        <p:txBody>
+          <a:bodyPr/>
+          <a:lstStyle/>
+          <a:p>
+            <a:fld id="{3847DB54-D037-B84F-B6F1-2E8DA40D09AD}" type="slidenum">
+              <a:rPr lang="en-US" smtClean="0"/>
+              <a:pPr/>
+              <a:t>10</a:t>
+            </a:fld>
+            <a:endParaRPr lang="en-US"/>
+          </a:p>
+        </p:txBody>
+      </p:sp>
+      <p:sp>
+        <p:nvSpPr>
+          <p:cNvPr id="5" name="Content Placeholder 4"/>
+          <p:cNvSpPr>
+            <a:spLocks noGrp="1"/>
+          </p:cNvSpPr>
+          <p:nvPr>
+            <p:ph idx="1"/>
+          </p:nvPr>
+        </p:nvSpPr>
+        <p:spPr/>
+        <p:txBody>
+          <a:bodyPr/>
+          <a:lstStyle/>
+          <a:p>
+            <a:pPr marL="342900" indent="-342900">
+              <a:buFont typeface="Arial" panose="020B0604020202020204" pitchFamily="34" charset="0"/>
+              <a:buChar char="•"/>
+            </a:pPr>
+            <a:endParaRPr lang="en-US" dirty="0"/>
+          </a:p>
+        </p:txBody>
+      </p:sp>
+      <p:sp>
+        <p:nvSpPr>
+          <p:cNvPr id="6" name="Title 5"/>
+          <p:cNvSpPr>
+            <a:spLocks noGrp="1"/>
+          </p:cNvSpPr>
+          <p:nvPr>
+            <p:ph type="title"/>
+          </p:nvPr>
+        </p:nvSpPr>
+        <p:spPr/>
+        <p:txBody>
+          <a:bodyPr/>
+          <a:lstStyle/>
+          <a:p>
+            <a:endParaRPr lang="pt-BR" dirty="0"/>
+          </a:p>
+        </p:txBody>
+      </p:sp>
+      <p:pic>
+        <p:nvPicPr>
+          <p:cNvPr id="4" name="Picture 3">
+            <a:extLst>
+              <a:ext uri="{FF2B5EF4-FFF2-40B4-BE49-F238E27FC236}">
+                <a16:creationId xmlns:a16="http://schemas.microsoft.com/office/drawing/2014/main" id="{4A9B1FB6-6BD7-4B61-9B1F-9A27C671EB8B}"/>
+              </a:ext>
+            </a:extLst>
+          </p:cNvPr>
+          <p:cNvPicPr>
+            <a:picLocks noChangeAspect="1"/>
+          </p:cNvPicPr>
+          <p:nvPr/>
+        </p:nvPicPr>
+        <p:blipFill>
+          <a:blip r:embed="rId2"/>
+          <a:stretch>
+            <a:fillRect/>
+          </a:stretch>
+        </p:blipFill>
+        <p:spPr>
+          <a:xfrm>
+            <a:off x="10690123" y="210236"/>
+            <a:ext cx="1359310" cy="1359310"/>
+          </a:xfrm>
+          <a:prstGeom prst="rect">
+            <a:avLst/>
+          </a:prstGeom>
+        </p:spPr>
+      </p:pic>
+      <p:pic>
+        <p:nvPicPr>
+          <p:cNvPr id="7" name="Picture 6">
+            <a:extLst>
+              <a:ext uri="{FF2B5EF4-FFF2-40B4-BE49-F238E27FC236}">
+                <a16:creationId xmlns:a16="http://schemas.microsoft.com/office/drawing/2014/main" id="{00D42C46-FF4A-41EF-A06B-05D91FA7C0AD}"/>
+              </a:ext>
+            </a:extLst>
+          </p:cNvPr>
+          <p:cNvPicPr>
+            <a:picLocks noChangeAspect="1"/>
+          </p:cNvPicPr>
+          <p:nvPr/>
+        </p:nvPicPr>
+        <p:blipFill>
+          <a:blip r:embed="rId3"/>
+          <a:stretch>
+            <a:fillRect/>
+          </a:stretch>
+        </p:blipFill>
+        <p:spPr>
+          <a:xfrm>
+            <a:off x="2241755" y="2035277"/>
+            <a:ext cx="7230049" cy="3620052"/>
+          </a:xfrm>
+          <a:prstGeom prst="rect">
+            <a:avLst/>
+          </a:prstGeom>
+        </p:spPr>
+      </p:pic>
+    </p:spTree>
+    <p:extLst>
+      <p:ext uri="{BB962C8B-B14F-4D97-AF65-F5344CB8AC3E}">
+        <p14:creationId xmlns:p14="http://schemas.microsoft.com/office/powerpoint/2010/main" val="3444935388"/>
+      </p:ext>
+    </p:extLst>
+  </p:cSld>
+  <p:clrMapOvr>
+    <a:masterClrMapping/>
+  </p:clrMapOvr>
+  <p:transition>
+    <p:fade/>
+  </p:transition>
+</p:sld>
+</file>
+
+<file path=ppt/slides/slide11.xml><?xml version="1.0" encoding="utf-8"?>
+<p:sld xmlns:a="http://schemas.openxmlformats.org/drawingml/2006/main" xmlns:r="http://schemas.openxmlformats.org/officeDocument/2006/relationships" xmlns:p="http://schemas.openxmlformats.org/presentationml/2006/main">
+  <p:cSld>
+    <p:spTree>
+      <p:nvGrpSpPr>
+        <p:cNvPr id="1" name=""/>
+        <p:cNvGrpSpPr/>
+        <p:nvPr/>
+      </p:nvGrpSpPr>
+      <p:grpSpPr>
+        <a:xfrm>
+          <a:off x="0" y="0"/>
+          <a:ext cx="0" cy="0"/>
+          <a:chOff x="0" y="0"/>
+          <a:chExt cx="0" cy="0"/>
+        </a:xfrm>
+      </p:grpSpPr>
+      <p:sp>
+        <p:nvSpPr>
+          <p:cNvPr id="2" name="Slide Number Placeholder 1"/>
+          <p:cNvSpPr>
+            <a:spLocks noGrp="1"/>
+          </p:cNvSpPr>
+          <p:nvPr>
+            <p:ph type="sldNum" sz="quarter" idx="12"/>
+          </p:nvPr>
+        </p:nvSpPr>
+        <p:spPr/>
+        <p:txBody>
+          <a:bodyPr/>
+          <a:lstStyle/>
+          <a:p>
+            <a:fld id="{3847DB54-D037-B84F-B6F1-2E8DA40D09AD}" type="slidenum">
+              <a:rPr lang="en-US" smtClean="0"/>
+              <a:pPr/>
+              <a:t>11</a:t>
+            </a:fld>
+            <a:endParaRPr lang="en-US"/>
+          </a:p>
+        </p:txBody>
+      </p:sp>
+      <p:sp>
+        <p:nvSpPr>
+          <p:cNvPr id="5" name="Content Placeholder 4"/>
+          <p:cNvSpPr>
+            <a:spLocks noGrp="1"/>
+          </p:cNvSpPr>
+          <p:nvPr>
+            <p:ph idx="1"/>
+          </p:nvPr>
+        </p:nvSpPr>
+        <p:spPr/>
+        <p:txBody>
+          <a:bodyPr/>
+          <a:lstStyle/>
+          <a:p>
+            <a:pPr marL="342900" indent="-342900">
+              <a:buFont typeface="Arial" panose="020B0604020202020204" pitchFamily="34" charset="0"/>
+              <a:buChar char="•"/>
+            </a:pPr>
+            <a:r>
+              <a:rPr lang="en-US" dirty="0"/>
+              <a:t>No </a:t>
+            </a:r>
+            <a:r>
+              <a:rPr lang="en-US" dirty="0" err="1"/>
+              <a:t>último</a:t>
+            </a:r>
+            <a:r>
+              <a:rPr lang="en-US" dirty="0"/>
+              <a:t> </a:t>
+            </a:r>
+            <a:r>
+              <a:rPr lang="en-US" dirty="0" err="1"/>
+              <a:t>exemplo</a:t>
+            </a:r>
+            <a:r>
+              <a:rPr lang="en-US" dirty="0"/>
+              <a:t> </a:t>
+            </a:r>
+            <a:r>
+              <a:rPr lang="en-US" dirty="0" err="1"/>
+              <a:t>utilizando</a:t>
+            </a:r>
+            <a:r>
+              <a:rPr lang="en-US" dirty="0"/>
+              <a:t> o Two Way Binding com a </a:t>
+            </a:r>
+            <a:r>
+              <a:rPr lang="en-US" dirty="0" err="1"/>
+              <a:t>sintaxe</a:t>
+            </a:r>
+            <a:r>
+              <a:rPr lang="en-US" dirty="0"/>
+              <a:t> </a:t>
+            </a:r>
+            <a:r>
+              <a:rPr lang="en-US" dirty="0" err="1"/>
+              <a:t>facilitadora</a:t>
+            </a:r>
+            <a:r>
+              <a:rPr lang="en-US" dirty="0"/>
+              <a:t>, </a:t>
+            </a:r>
+            <a:r>
+              <a:rPr lang="en-US" dirty="0" err="1"/>
+              <a:t>vamos</a:t>
+            </a:r>
+            <a:r>
+              <a:rPr lang="en-US" dirty="0"/>
+              <a:t> </a:t>
+            </a:r>
+            <a:r>
+              <a:rPr lang="en-US" dirty="0" err="1"/>
+              <a:t>criar</a:t>
+            </a:r>
+            <a:r>
+              <a:rPr lang="en-US" dirty="0"/>
+              <a:t> um </a:t>
+            </a:r>
+            <a:r>
+              <a:rPr lang="en-US" dirty="0" err="1"/>
+              <a:t>componente</a:t>
+            </a:r>
+            <a:r>
+              <a:rPr lang="en-US" dirty="0"/>
+              <a:t> </a:t>
+            </a:r>
+            <a:r>
+              <a:rPr lang="en-US" dirty="0" err="1"/>
+              <a:t>chamado</a:t>
+            </a:r>
+            <a:r>
+              <a:rPr lang="en-US" dirty="0"/>
+              <a:t> </a:t>
+            </a:r>
+            <a:r>
+              <a:rPr lang="en-US" dirty="0" err="1"/>
+              <a:t>terceiro</a:t>
+            </a:r>
+            <a:r>
+              <a:rPr lang="en-US" dirty="0"/>
+              <a:t>.</a:t>
+            </a:r>
+          </a:p>
+          <a:p>
+            <a:pPr marL="342900" indent="-342900">
+              <a:buFont typeface="Arial" panose="020B0604020202020204" pitchFamily="34" charset="0"/>
+              <a:buChar char="•"/>
+            </a:pPr>
+            <a:r>
+              <a:rPr lang="en-US" dirty="0"/>
+              <a:t>Na </a:t>
+            </a:r>
+            <a:r>
+              <a:rPr lang="en-US" dirty="0" err="1"/>
+              <a:t>classe</a:t>
+            </a:r>
+            <a:r>
+              <a:rPr lang="en-US" dirty="0"/>
+              <a:t> do </a:t>
+            </a:r>
+            <a:r>
+              <a:rPr lang="en-US" dirty="0" err="1"/>
+              <a:t>componente</a:t>
+            </a:r>
+            <a:r>
+              <a:rPr lang="en-US" dirty="0"/>
+              <a:t> </a:t>
+            </a:r>
+            <a:r>
+              <a:rPr lang="en-US" dirty="0" err="1"/>
+              <a:t>vamos</a:t>
+            </a:r>
+            <a:r>
+              <a:rPr lang="en-US" dirty="0"/>
+              <a:t> </a:t>
+            </a:r>
+            <a:r>
+              <a:rPr lang="en-US" dirty="0" err="1"/>
+              <a:t>criar</a:t>
+            </a:r>
+            <a:r>
+              <a:rPr lang="en-US" dirty="0"/>
+              <a:t> um </a:t>
+            </a:r>
+            <a:r>
+              <a:rPr lang="en-US" dirty="0" err="1"/>
+              <a:t>atributo</a:t>
+            </a:r>
+            <a:r>
+              <a:rPr lang="en-US" dirty="0"/>
+              <a:t> </a:t>
+            </a:r>
+            <a:r>
+              <a:rPr lang="en-US" dirty="0" err="1"/>
+              <a:t>idade</a:t>
+            </a:r>
+            <a:r>
+              <a:rPr lang="en-US" dirty="0"/>
+              <a:t> do </a:t>
+            </a:r>
+            <a:r>
+              <a:rPr lang="en-US" dirty="0" err="1"/>
+              <a:t>tipo</a:t>
+            </a:r>
+            <a:r>
+              <a:rPr lang="en-US" dirty="0"/>
+              <a:t> number.</a:t>
+            </a:r>
+          </a:p>
+          <a:p>
+            <a:pPr marL="342900" indent="-342900">
+              <a:buFont typeface="Arial" panose="020B0604020202020204" pitchFamily="34" charset="0"/>
+              <a:buChar char="•"/>
+            </a:pPr>
+            <a:r>
+              <a:rPr lang="en-US" dirty="0"/>
+              <a:t>Agora no template, </a:t>
+            </a:r>
+            <a:r>
+              <a:rPr lang="en-US" dirty="0" err="1"/>
+              <a:t>vamos</a:t>
+            </a:r>
+            <a:r>
+              <a:rPr lang="en-US" dirty="0"/>
+              <a:t> </a:t>
+            </a:r>
+            <a:r>
+              <a:rPr lang="en-US" dirty="0" err="1"/>
+              <a:t>utilizar</a:t>
+            </a:r>
+            <a:r>
+              <a:rPr lang="en-US" dirty="0"/>
+              <a:t> para </a:t>
+            </a:r>
+            <a:r>
+              <a:rPr lang="en-US" dirty="0" err="1"/>
+              <a:t>estilizar</a:t>
+            </a:r>
+            <a:r>
+              <a:rPr lang="en-US" dirty="0"/>
+              <a:t> o fluid jumbotron do bootstrap, </a:t>
+            </a:r>
+            <a:r>
+              <a:rPr lang="en-US" dirty="0" err="1"/>
+              <a:t>como</a:t>
+            </a:r>
+            <a:r>
+              <a:rPr lang="en-US" dirty="0"/>
+              <a:t> </a:t>
+            </a:r>
+            <a:r>
+              <a:rPr lang="en-US" dirty="0" err="1"/>
+              <a:t>feito</a:t>
+            </a:r>
+            <a:r>
+              <a:rPr lang="en-US" dirty="0"/>
+              <a:t> </a:t>
+            </a:r>
+            <a:r>
+              <a:rPr lang="en-US" dirty="0" err="1"/>
+              <a:t>nos</a:t>
+            </a:r>
+            <a:r>
+              <a:rPr lang="en-US" dirty="0"/>
+              <a:t> </a:t>
+            </a:r>
+            <a:r>
+              <a:rPr lang="en-US" dirty="0" err="1"/>
+              <a:t>exemplos</a:t>
+            </a:r>
+            <a:r>
+              <a:rPr lang="en-US" dirty="0"/>
+              <a:t> </a:t>
+            </a:r>
+            <a:r>
+              <a:rPr lang="en-US" dirty="0" err="1"/>
+              <a:t>anteriores</a:t>
+            </a:r>
+            <a:r>
+              <a:rPr lang="en-US" dirty="0"/>
+              <a:t>.</a:t>
+            </a:r>
+          </a:p>
+          <a:p>
+            <a:pPr marL="342900" indent="-342900">
+              <a:buFont typeface="Arial" panose="020B0604020202020204" pitchFamily="34" charset="0"/>
+              <a:buChar char="•"/>
+            </a:pPr>
+            <a:r>
+              <a:rPr lang="en-US" dirty="0"/>
+              <a:t>Neste input </a:t>
+            </a:r>
+            <a:r>
+              <a:rPr lang="en-US" dirty="0" err="1"/>
+              <a:t>vamos</a:t>
+            </a:r>
+            <a:r>
+              <a:rPr lang="en-US" dirty="0"/>
+              <a:t> </a:t>
+            </a:r>
+            <a:r>
+              <a:rPr lang="en-US" dirty="0" err="1"/>
+              <a:t>utilizar</a:t>
+            </a:r>
+            <a:r>
+              <a:rPr lang="en-US" dirty="0"/>
+              <a:t> o Two Way Binding para </a:t>
+            </a:r>
+            <a:r>
+              <a:rPr lang="en-US" dirty="0" err="1"/>
+              <a:t>atualizarmos</a:t>
+            </a:r>
+            <a:r>
+              <a:rPr lang="en-US" dirty="0"/>
+              <a:t> o campo </a:t>
+            </a:r>
+            <a:r>
+              <a:rPr lang="en-US" dirty="0" err="1"/>
+              <a:t>idade</a:t>
+            </a:r>
+            <a:endParaRPr lang="en-US" dirty="0"/>
+          </a:p>
+          <a:p>
+            <a:pPr marL="342900" indent="-342900">
+              <a:buFont typeface="Arial" panose="020B0604020202020204" pitchFamily="34" charset="0"/>
+              <a:buChar char="•"/>
+            </a:pPr>
+            <a:r>
+              <a:rPr lang="en-US" dirty="0"/>
+              <a:t>Neste </a:t>
+            </a:r>
+            <a:r>
+              <a:rPr lang="en-US" dirty="0" err="1"/>
+              <a:t>momento</a:t>
+            </a:r>
+            <a:r>
+              <a:rPr lang="en-US" dirty="0"/>
+              <a:t> </a:t>
+            </a:r>
+            <a:r>
+              <a:rPr lang="en-US" dirty="0" err="1"/>
+              <a:t>quando</a:t>
+            </a:r>
+            <a:r>
+              <a:rPr lang="en-US" dirty="0"/>
+              <a:t> </a:t>
+            </a:r>
+            <a:r>
+              <a:rPr lang="en-US" dirty="0" err="1"/>
+              <a:t>digitamos</a:t>
+            </a:r>
+            <a:r>
+              <a:rPr lang="en-US" dirty="0"/>
+              <a:t> a </a:t>
+            </a:r>
+            <a:r>
+              <a:rPr lang="en-US" dirty="0" err="1"/>
+              <a:t>idade</a:t>
+            </a:r>
+            <a:r>
+              <a:rPr lang="en-US" dirty="0"/>
+              <a:t> no input o template </a:t>
+            </a:r>
+            <a:r>
+              <a:rPr lang="en-US" dirty="0" err="1"/>
+              <a:t>também</a:t>
+            </a:r>
+            <a:r>
+              <a:rPr lang="en-US" dirty="0"/>
+              <a:t> é </a:t>
+            </a:r>
+            <a:r>
+              <a:rPr lang="en-US" dirty="0" err="1"/>
+              <a:t>atualizado</a:t>
+            </a:r>
+            <a:r>
+              <a:rPr lang="en-US" dirty="0"/>
+              <a:t>.</a:t>
+            </a:r>
+          </a:p>
+        </p:txBody>
+      </p:sp>
+      <p:sp>
+        <p:nvSpPr>
+          <p:cNvPr id="6" name="Title 5"/>
+          <p:cNvSpPr>
+            <a:spLocks noGrp="1"/>
+          </p:cNvSpPr>
+          <p:nvPr>
+            <p:ph type="title"/>
+          </p:nvPr>
+        </p:nvSpPr>
+        <p:spPr/>
+        <p:txBody>
+          <a:bodyPr/>
+          <a:lstStyle/>
+          <a:p>
+            <a:endParaRPr lang="pt-BR" dirty="0"/>
+          </a:p>
+        </p:txBody>
+      </p:sp>
+      <p:pic>
+        <p:nvPicPr>
+          <p:cNvPr id="4" name="Picture 3">
+            <a:extLst>
+              <a:ext uri="{FF2B5EF4-FFF2-40B4-BE49-F238E27FC236}">
+                <a16:creationId xmlns:a16="http://schemas.microsoft.com/office/drawing/2014/main" id="{4A9B1FB6-6BD7-4B61-9B1F-9A27C671EB8B}"/>
+              </a:ext>
+            </a:extLst>
+          </p:cNvPr>
+          <p:cNvPicPr>
+            <a:picLocks noChangeAspect="1"/>
+          </p:cNvPicPr>
+          <p:nvPr/>
+        </p:nvPicPr>
+        <p:blipFill>
+          <a:blip r:embed="rId2"/>
+          <a:stretch>
+            <a:fillRect/>
+          </a:stretch>
+        </p:blipFill>
+        <p:spPr>
+          <a:xfrm>
+            <a:off x="10690123" y="210236"/>
+            <a:ext cx="1359310" cy="1359310"/>
+          </a:xfrm>
+          <a:prstGeom prst="rect">
+            <a:avLst/>
+          </a:prstGeom>
+        </p:spPr>
+      </p:pic>
+    </p:spTree>
+    <p:extLst>
+      <p:ext uri="{BB962C8B-B14F-4D97-AF65-F5344CB8AC3E}">
+        <p14:creationId xmlns:p14="http://schemas.microsoft.com/office/powerpoint/2010/main" val="3972587211"/>
+      </p:ext>
+    </p:extLst>
+  </p:cSld>
+  <p:clrMapOvr>
+    <a:masterClrMapping/>
+  </p:clrMapOvr>
+  <p:transition>
+    <p:fade/>
+  </p:transition>
+</p:sld>
+</file>
+
+<file path=ppt/slides/slide12.xml><?xml version="1.0" encoding="utf-8"?>
+<p:sld xmlns:a="http://schemas.openxmlformats.org/drawingml/2006/main" xmlns:r="http://schemas.openxmlformats.org/officeDocument/2006/relationships" xmlns:p="http://schemas.openxmlformats.org/presentationml/2006/main">
+  <p:cSld>
+    <p:spTree>
+      <p:nvGrpSpPr>
+        <p:cNvPr id="1" name=""/>
+        <p:cNvGrpSpPr/>
+        <p:nvPr/>
+      </p:nvGrpSpPr>
+      <p:grpSpPr>
+        <a:xfrm>
+          <a:off x="0" y="0"/>
+          <a:ext cx="0" cy="0"/>
+          <a:chOff x="0" y="0"/>
+          <a:chExt cx="0" cy="0"/>
+        </a:xfrm>
+      </p:grpSpPr>
+      <p:sp>
+        <p:nvSpPr>
+          <p:cNvPr id="2" name="Slide Number Placeholder 1"/>
+          <p:cNvSpPr>
+            <a:spLocks noGrp="1"/>
+          </p:cNvSpPr>
+          <p:nvPr>
+            <p:ph type="sldNum" sz="quarter" idx="12"/>
+          </p:nvPr>
+        </p:nvSpPr>
+        <p:spPr/>
+        <p:txBody>
+          <a:bodyPr/>
+          <a:lstStyle/>
+          <a:p>
+            <a:fld id="{3847DB54-D037-B84F-B6F1-2E8DA40D09AD}" type="slidenum">
+              <a:rPr lang="en-US" smtClean="0"/>
+              <a:pPr/>
+              <a:t>12</a:t>
+            </a:fld>
+            <a:endParaRPr lang="en-US"/>
+          </a:p>
+        </p:txBody>
+      </p:sp>
+      <p:sp>
+        <p:nvSpPr>
+          <p:cNvPr id="5" name="Content Placeholder 4"/>
+          <p:cNvSpPr>
+            <a:spLocks noGrp="1"/>
+          </p:cNvSpPr>
+          <p:nvPr>
+            <p:ph idx="1"/>
+          </p:nvPr>
+        </p:nvSpPr>
+        <p:spPr/>
+        <p:txBody>
+          <a:bodyPr/>
+          <a:lstStyle/>
+          <a:p>
+            <a:endParaRPr lang="en-US" dirty="0"/>
+          </a:p>
+        </p:txBody>
+      </p:sp>
+      <p:sp>
+        <p:nvSpPr>
+          <p:cNvPr id="6" name="Title 5"/>
+          <p:cNvSpPr>
+            <a:spLocks noGrp="1"/>
+          </p:cNvSpPr>
+          <p:nvPr>
+            <p:ph type="title"/>
+          </p:nvPr>
+        </p:nvSpPr>
+        <p:spPr/>
+        <p:txBody>
+          <a:bodyPr/>
+          <a:lstStyle/>
+          <a:p>
+            <a:r>
+              <a:rPr lang="pt-BR" dirty="0"/>
+              <a:t>Nossa Aplicação Final</a:t>
+            </a:r>
+          </a:p>
+        </p:txBody>
+      </p:sp>
+      <p:pic>
+        <p:nvPicPr>
+          <p:cNvPr id="4" name="Picture 3">
+            <a:extLst>
+              <a:ext uri="{FF2B5EF4-FFF2-40B4-BE49-F238E27FC236}">
+                <a16:creationId xmlns:a16="http://schemas.microsoft.com/office/drawing/2014/main" id="{4A9B1FB6-6BD7-4B61-9B1F-9A27C671EB8B}"/>
+              </a:ext>
+            </a:extLst>
+          </p:cNvPr>
+          <p:cNvPicPr>
+            <a:picLocks noChangeAspect="1"/>
+          </p:cNvPicPr>
+          <p:nvPr/>
+        </p:nvPicPr>
+        <p:blipFill>
+          <a:blip r:embed="rId2"/>
+          <a:stretch>
+            <a:fillRect/>
+          </a:stretch>
+        </p:blipFill>
+        <p:spPr>
+          <a:xfrm>
+            <a:off x="10690123" y="210236"/>
+            <a:ext cx="1359310" cy="1359310"/>
+          </a:xfrm>
+          <a:prstGeom prst="rect">
+            <a:avLst/>
+          </a:prstGeom>
+        </p:spPr>
+      </p:pic>
+      <p:pic>
+        <p:nvPicPr>
+          <p:cNvPr id="3" name="Picture 2">
+            <a:extLst>
+              <a:ext uri="{FF2B5EF4-FFF2-40B4-BE49-F238E27FC236}">
+                <a16:creationId xmlns:a16="http://schemas.microsoft.com/office/drawing/2014/main" id="{8CB73578-2CA8-480C-8879-231675B4A3B5}"/>
+              </a:ext>
+            </a:extLst>
+          </p:cNvPr>
+          <p:cNvPicPr>
+            <a:picLocks noChangeAspect="1"/>
+          </p:cNvPicPr>
+          <p:nvPr/>
+        </p:nvPicPr>
+        <p:blipFill>
+          <a:blip r:embed="rId3"/>
+          <a:stretch>
+            <a:fillRect/>
+          </a:stretch>
+        </p:blipFill>
+        <p:spPr>
+          <a:xfrm>
+            <a:off x="1347018" y="1569546"/>
+            <a:ext cx="9497961" cy="4453773"/>
+          </a:xfrm>
+          <a:prstGeom prst="rect">
+            <a:avLst/>
+          </a:prstGeom>
+        </p:spPr>
+      </p:pic>
+    </p:spTree>
+    <p:extLst>
+      <p:ext uri="{BB962C8B-B14F-4D97-AF65-F5344CB8AC3E}">
+        <p14:creationId xmlns:p14="http://schemas.microsoft.com/office/powerpoint/2010/main" val="1963298545"/>
+      </p:ext>
+    </p:extLst>
+  </p:cSld>
+  <p:clrMapOvr>
+    <a:masterClrMapping/>
+  </p:clrMapOvr>
+  <p:transition>
+    <p:fade/>
+  </p:transition>
+</p:sld>
+</file>
+
+<file path=ppt/slides/slide13.xml><?xml version="1.0" encoding="utf-8"?>
+<p:sld xmlns:a="http://schemas.openxmlformats.org/drawingml/2006/main" xmlns:r="http://schemas.openxmlformats.org/officeDocument/2006/relationships" xmlns:p="http://schemas.openxmlformats.org/presentationml/2006/main">
+  <p:cSld>
+    <p:spTree>
+      <p:nvGrpSpPr>
+        <p:cNvPr id="1" name=""/>
+        <p:cNvGrpSpPr/>
+        <p:nvPr/>
+      </p:nvGrpSpPr>
+      <p:grpSpPr>
+        <a:xfrm>
+          <a:off x="0" y="0"/>
+          <a:ext cx="0" cy="0"/>
+          <a:chOff x="0" y="0"/>
+          <a:chExt cx="0" cy="0"/>
+        </a:xfrm>
+      </p:grpSpPr>
+      <p:sp>
+        <p:nvSpPr>
+          <p:cNvPr id="4" name="Slide Number Placeholder 3"/>
+          <p:cNvSpPr>
+            <a:spLocks noGrp="1"/>
+          </p:cNvSpPr>
+          <p:nvPr>
+            <p:ph type="sldNum" sz="quarter" idx="4294967295"/>
+          </p:nvPr>
+        </p:nvSpPr>
+        <p:spPr>
+          <a:xfrm>
+            <a:off x="11695113" y="6356350"/>
+            <a:ext cx="496887" cy="365125"/>
+          </a:xfrm>
+          <a:prstGeom prst="rect">
+            <a:avLst/>
+          </a:prstGeom>
+        </p:spPr>
+        <p:txBody>
+          <a:bodyPr/>
+          <a:lstStyle/>
+          <a:p>
+            <a:fld id="{3847DB54-D037-B84F-B6F1-2E8DA40D09AD}" type="slidenum">
+              <a:rPr lang="en-US" smtClean="0"/>
+              <a:pPr/>
+              <a:t>13</a:t>
+            </a:fld>
+            <a:endParaRPr lang="en-US"/>
+          </a:p>
+        </p:txBody>
+      </p:sp>
+    </p:spTree>
+    <p:extLst>
+      <p:ext uri="{BB962C8B-B14F-4D97-AF65-F5344CB8AC3E}">
+        <p14:creationId xmlns:p14="http://schemas.microsoft.com/office/powerpoint/2010/main" val="857736654"/>
+      </p:ext>
+    </p:extLst>
+  </p:cSld>
+  <p:clrMapOvr>
+    <a:masterClrMapping/>
+  </p:clrMapOvr>
+  <p:transition>
+    <p:fade/>
+  </p:transition>
+</p:sld>
+</file>
+
 <file path=ppt/slides/slide2.xml><?xml version="1.0" encoding="utf-8"?>
 <p:sld xmlns:a="http://schemas.openxmlformats.org/drawingml/2006/main" xmlns:r="http://schemas.openxmlformats.org/officeDocument/2006/relationships" xmlns:p="http://schemas.openxmlformats.org/presentationml/2006/main">
   <p:cSld>
@@ -7773,6 +8618,692 @@
           <a:lstStyle/>
           <a:p>
             <a:pPr marL="342900" indent="-342900">
+              <a:buFont typeface="Arial" panose="020B0604020202020204" pitchFamily="34" charset="0"/>
+              <a:buChar char="•"/>
+            </a:pPr>
+            <a:r>
+              <a:rPr lang="en-US" dirty="0"/>
+              <a:t>É o </a:t>
+            </a:r>
+            <a:r>
+              <a:rPr lang="en-US" dirty="0" err="1"/>
+              <a:t>recurso</a:t>
+            </a:r>
+            <a:r>
+              <a:rPr lang="en-US" dirty="0"/>
+              <a:t> que </a:t>
+            </a:r>
+            <a:r>
+              <a:rPr lang="en-US" dirty="0" err="1"/>
+              <a:t>nos</a:t>
+            </a:r>
+            <a:r>
+              <a:rPr lang="en-US" dirty="0"/>
+              <a:t> </a:t>
+            </a:r>
+            <a:r>
+              <a:rPr lang="en-US" dirty="0" err="1"/>
+              <a:t>possibilita</a:t>
+            </a:r>
+            <a:r>
+              <a:rPr lang="en-US" dirty="0"/>
+              <a:t> </a:t>
+            </a:r>
+            <a:r>
+              <a:rPr lang="en-US" dirty="0" err="1"/>
+              <a:t>atualizar</a:t>
+            </a:r>
+            <a:r>
+              <a:rPr lang="en-US" dirty="0"/>
+              <a:t> </a:t>
+            </a:r>
+            <a:r>
+              <a:rPr lang="en-US" dirty="0" err="1"/>
+              <a:t>ao</a:t>
+            </a:r>
+            <a:r>
+              <a:rPr lang="en-US" dirty="0"/>
+              <a:t> </a:t>
+            </a:r>
+            <a:r>
+              <a:rPr lang="en-US" dirty="0" err="1"/>
+              <a:t>mesmo</a:t>
+            </a:r>
+            <a:r>
+              <a:rPr lang="en-US" dirty="0"/>
+              <a:t> tempo Template e o </a:t>
+            </a:r>
+            <a:r>
+              <a:rPr lang="en-US" dirty="0" err="1"/>
+              <a:t>Componente</a:t>
+            </a:r>
+            <a:r>
+              <a:rPr lang="en-US" dirty="0"/>
+              <a:t>.</a:t>
+            </a:r>
+          </a:p>
+          <a:p>
+            <a:pPr marL="342900" indent="-342900">
+              <a:buFont typeface="Arial" panose="020B0604020202020204" pitchFamily="34" charset="0"/>
+              <a:buChar char="•"/>
+            </a:pPr>
+            <a:r>
+              <a:rPr lang="en-US" dirty="0"/>
+              <a:t>Para </a:t>
+            </a:r>
+            <a:r>
+              <a:rPr lang="en-US" dirty="0" err="1"/>
+              <a:t>atualizarmos</a:t>
+            </a:r>
+            <a:r>
+              <a:rPr lang="en-US" dirty="0"/>
+              <a:t> </a:t>
+            </a:r>
+            <a:r>
+              <a:rPr lang="en-US" dirty="0" err="1"/>
+              <a:t>tanto</a:t>
+            </a:r>
+            <a:r>
+              <a:rPr lang="en-US" dirty="0"/>
+              <a:t> o Template </a:t>
+            </a:r>
+            <a:r>
+              <a:rPr lang="en-US" dirty="0" err="1"/>
+              <a:t>quanto</a:t>
+            </a:r>
+            <a:r>
+              <a:rPr lang="en-US" dirty="0"/>
+              <a:t> o </a:t>
+            </a:r>
+            <a:r>
+              <a:rPr lang="en-US" dirty="0" err="1"/>
+              <a:t>Componente</a:t>
+            </a:r>
+            <a:r>
+              <a:rPr lang="en-US" dirty="0"/>
+              <a:t> </a:t>
+            </a:r>
+            <a:r>
+              <a:rPr lang="en-US" dirty="0" err="1"/>
+              <a:t>temos</a:t>
+            </a:r>
+            <a:r>
+              <a:rPr lang="en-US" dirty="0"/>
+              <a:t> que </a:t>
+            </a:r>
+            <a:r>
+              <a:rPr lang="en-US" dirty="0" err="1"/>
+              <a:t>utilizar</a:t>
+            </a:r>
+            <a:r>
+              <a:rPr lang="en-US" dirty="0"/>
+              <a:t> </a:t>
+            </a:r>
+            <a:r>
+              <a:rPr lang="en-US" dirty="0" err="1"/>
+              <a:t>juntos</a:t>
+            </a:r>
+            <a:r>
+              <a:rPr lang="en-US" dirty="0"/>
+              <a:t> o Property Binding e o Event Binding.</a:t>
+            </a:r>
+          </a:p>
+          <a:p>
+            <a:pPr marL="1028700" lvl="1" indent="-342900">
+              <a:buFont typeface="Arial" panose="020B0604020202020204" pitchFamily="34" charset="0"/>
+              <a:buChar char="•"/>
+            </a:pPr>
+            <a:r>
+              <a:rPr lang="en-US" dirty="0" err="1"/>
+              <a:t>Exemplo</a:t>
+            </a:r>
+            <a:r>
+              <a:rPr lang="en-US" dirty="0"/>
+              <a:t>: &lt;input type=“text” </a:t>
+            </a:r>
+            <a:r>
+              <a:rPr lang="en-US" b="1" dirty="0"/>
+              <a:t>[value]=“</a:t>
+            </a:r>
+            <a:r>
+              <a:rPr lang="en-US" b="1" dirty="0" err="1"/>
+              <a:t>nome</a:t>
+            </a:r>
+            <a:r>
+              <a:rPr lang="en-US" b="1" dirty="0"/>
+              <a:t>” (input)=“</a:t>
+            </a:r>
+            <a:r>
+              <a:rPr lang="en-US" b="1" dirty="0" err="1"/>
+              <a:t>atualizaNome</a:t>
+            </a:r>
+            <a:r>
+              <a:rPr lang="en-US" b="1" dirty="0"/>
+              <a:t>($event)”</a:t>
+            </a:r>
+            <a:r>
+              <a:rPr lang="en-US" dirty="0"/>
+              <a:t>/&gt;</a:t>
+            </a:r>
+          </a:p>
+          <a:p>
+            <a:pPr marL="1028700" lvl="1" indent="-342900">
+              <a:buFont typeface="Arial" panose="020B0604020202020204" pitchFamily="34" charset="0"/>
+              <a:buChar char="•"/>
+            </a:pPr>
+            <a:r>
+              <a:rPr lang="en-US" dirty="0"/>
+              <a:t>No </a:t>
+            </a:r>
+            <a:r>
+              <a:rPr lang="en-US" dirty="0" err="1"/>
+              <a:t>caso</a:t>
+            </a:r>
+            <a:r>
+              <a:rPr lang="en-US" dirty="0"/>
+              <a:t> </a:t>
+            </a:r>
+            <a:r>
+              <a:rPr lang="en-US" b="1" dirty="0"/>
+              <a:t>[value]=“</a:t>
+            </a:r>
+            <a:r>
+              <a:rPr lang="en-US" b="1" dirty="0" err="1"/>
+              <a:t>nome</a:t>
+            </a:r>
+            <a:r>
+              <a:rPr lang="en-US" dirty="0"/>
+              <a:t>” é o property binding, </a:t>
+            </a:r>
+            <a:r>
+              <a:rPr lang="en-US" dirty="0" err="1"/>
+              <a:t>ou</a:t>
+            </a:r>
+            <a:r>
+              <a:rPr lang="en-US" dirty="0"/>
+              <a:t> </a:t>
+            </a:r>
+            <a:r>
+              <a:rPr lang="en-US" dirty="0" err="1"/>
+              <a:t>seja</a:t>
+            </a:r>
+            <a:r>
+              <a:rPr lang="en-US" dirty="0"/>
+              <a:t>, o value do input </a:t>
+            </a:r>
+            <a:r>
+              <a:rPr lang="en-US" dirty="0" err="1"/>
+              <a:t>está</a:t>
+            </a:r>
+            <a:r>
+              <a:rPr lang="en-US" dirty="0"/>
+              <a:t> </a:t>
+            </a:r>
+            <a:r>
+              <a:rPr lang="en-US" dirty="0" err="1"/>
+              <a:t>recebendo</a:t>
+            </a:r>
+            <a:r>
+              <a:rPr lang="en-US" dirty="0"/>
+              <a:t> o valor da </a:t>
+            </a:r>
+            <a:r>
+              <a:rPr lang="en-US" dirty="0" err="1"/>
+              <a:t>variável</a:t>
+            </a:r>
+            <a:r>
+              <a:rPr lang="en-US" dirty="0"/>
+              <a:t> </a:t>
+            </a:r>
+            <a:r>
+              <a:rPr lang="en-US" dirty="0" err="1"/>
+              <a:t>nome</a:t>
+            </a:r>
+            <a:r>
+              <a:rPr lang="en-US" dirty="0"/>
+              <a:t> do </a:t>
+            </a:r>
+            <a:r>
+              <a:rPr lang="en-US" dirty="0" err="1"/>
+              <a:t>componente</a:t>
+            </a:r>
+            <a:r>
+              <a:rPr lang="en-US" dirty="0"/>
+              <a:t>.</a:t>
+            </a:r>
+          </a:p>
+          <a:p>
+            <a:pPr marL="1028700" lvl="1" indent="-342900">
+              <a:buFont typeface="Arial" panose="020B0604020202020204" pitchFamily="34" charset="0"/>
+              <a:buChar char="•"/>
+            </a:pPr>
+            <a:r>
+              <a:rPr lang="en-US" dirty="0"/>
+              <a:t>E no </a:t>
+            </a:r>
+            <a:r>
+              <a:rPr lang="en-US" dirty="0" err="1"/>
+              <a:t>caso</a:t>
+            </a:r>
+            <a:r>
+              <a:rPr lang="en-US" dirty="0"/>
+              <a:t> de </a:t>
+            </a:r>
+            <a:r>
+              <a:rPr lang="en-US" b="1" dirty="0"/>
+              <a:t>(input)=“</a:t>
+            </a:r>
+            <a:r>
+              <a:rPr lang="en-US" b="1" dirty="0" err="1"/>
+              <a:t>atualizaNome</a:t>
+            </a:r>
+            <a:r>
+              <a:rPr lang="en-US" b="1" dirty="0"/>
+              <a:t>($event)”</a:t>
+            </a:r>
+            <a:r>
+              <a:rPr lang="en-US" dirty="0"/>
+              <a:t> é o event binding, </a:t>
+            </a:r>
+            <a:r>
+              <a:rPr lang="en-US" dirty="0" err="1"/>
+              <a:t>onde</a:t>
+            </a:r>
+            <a:r>
+              <a:rPr lang="en-US" dirty="0"/>
+              <a:t> o </a:t>
+            </a:r>
+            <a:r>
+              <a:rPr lang="en-US" dirty="0" err="1"/>
+              <a:t>evento</a:t>
+            </a:r>
+            <a:r>
+              <a:rPr lang="en-US" dirty="0"/>
+              <a:t> input </a:t>
+            </a:r>
+            <a:r>
+              <a:rPr lang="en-US" dirty="0" err="1"/>
+              <a:t>dispara</a:t>
+            </a:r>
+            <a:r>
+              <a:rPr lang="en-US" dirty="0"/>
+              <a:t> o </a:t>
+            </a:r>
+            <a:r>
+              <a:rPr lang="en-US" dirty="0" err="1"/>
+              <a:t>método</a:t>
+            </a:r>
+            <a:r>
+              <a:rPr lang="en-US" dirty="0"/>
+              <a:t> </a:t>
+            </a:r>
+            <a:r>
+              <a:rPr lang="en-US" b="1" dirty="0" err="1"/>
+              <a:t>atualizaNome</a:t>
+            </a:r>
+            <a:r>
+              <a:rPr lang="en-US" dirty="0"/>
+              <a:t> </a:t>
+            </a:r>
+            <a:r>
+              <a:rPr lang="en-US" dirty="0" err="1"/>
+              <a:t>quando</a:t>
+            </a:r>
+            <a:r>
+              <a:rPr lang="en-US" dirty="0"/>
+              <a:t> </a:t>
+            </a:r>
+            <a:r>
+              <a:rPr lang="en-US" dirty="0" err="1"/>
+              <a:t>há</a:t>
+            </a:r>
+            <a:r>
+              <a:rPr lang="en-US" dirty="0"/>
+              <a:t> </a:t>
+            </a:r>
+            <a:r>
+              <a:rPr lang="en-US" dirty="0" err="1"/>
+              <a:t>alguma</a:t>
+            </a:r>
+            <a:r>
+              <a:rPr lang="en-US" dirty="0"/>
+              <a:t> </a:t>
+            </a:r>
+            <a:r>
+              <a:rPr lang="en-US" dirty="0" err="1"/>
+              <a:t>interação</a:t>
+            </a:r>
+            <a:r>
+              <a:rPr lang="en-US" dirty="0"/>
+              <a:t> no campo </a:t>
+            </a:r>
+            <a:r>
+              <a:rPr lang="en-US" dirty="0" err="1"/>
+              <a:t>texto</a:t>
+            </a:r>
+            <a:r>
+              <a:rPr lang="en-US" dirty="0"/>
+              <a:t> </a:t>
+            </a:r>
+            <a:r>
+              <a:rPr lang="en-US" dirty="0" err="1"/>
+              <a:t>atualizando</a:t>
+            </a:r>
+            <a:r>
+              <a:rPr lang="en-US" dirty="0"/>
+              <a:t> </a:t>
+            </a:r>
+            <a:r>
+              <a:rPr lang="en-US" dirty="0" err="1"/>
+              <a:t>então</a:t>
+            </a:r>
+            <a:r>
+              <a:rPr lang="en-US" dirty="0"/>
+              <a:t> a </a:t>
+            </a:r>
+            <a:r>
+              <a:rPr lang="en-US" dirty="0" err="1"/>
+              <a:t>variável</a:t>
+            </a:r>
+            <a:r>
+              <a:rPr lang="en-US" dirty="0"/>
+              <a:t> </a:t>
+            </a:r>
+            <a:r>
+              <a:rPr lang="en-US" dirty="0" err="1"/>
+              <a:t>nome</a:t>
+            </a:r>
+            <a:r>
+              <a:rPr lang="en-US" dirty="0"/>
+              <a:t>.</a:t>
+            </a:r>
+          </a:p>
+          <a:p>
+            <a:pPr marL="1028700" lvl="1" indent="-342900">
+              <a:buFont typeface="Arial" panose="020B0604020202020204" pitchFamily="34" charset="0"/>
+              <a:buChar char="•"/>
+            </a:pPr>
+            <a:r>
+              <a:rPr lang="en-US" dirty="0"/>
+              <a:t>O </a:t>
+            </a:r>
+            <a:r>
+              <a:rPr lang="en-US" b="1" dirty="0"/>
+              <a:t>$event </a:t>
+            </a:r>
+            <a:r>
+              <a:rPr lang="en-US" dirty="0"/>
+              <a:t>é </a:t>
+            </a:r>
+            <a:r>
+              <a:rPr lang="en-US" dirty="0" err="1"/>
+              <a:t>responsável</a:t>
+            </a:r>
+            <a:r>
+              <a:rPr lang="en-US" dirty="0"/>
+              <a:t> </a:t>
+            </a:r>
+            <a:r>
+              <a:rPr lang="en-US" dirty="0" err="1"/>
+              <a:t>por</a:t>
+            </a:r>
+            <a:r>
+              <a:rPr lang="en-US" dirty="0"/>
+              <a:t> </a:t>
+            </a:r>
+            <a:r>
+              <a:rPr lang="en-US" dirty="0" err="1"/>
+              <a:t>capturar</a:t>
+            </a:r>
+            <a:r>
+              <a:rPr lang="en-US" dirty="0"/>
+              <a:t> o </a:t>
+            </a:r>
+            <a:r>
+              <a:rPr lang="en-US" dirty="0" err="1"/>
+              <a:t>estado</a:t>
+            </a:r>
+            <a:r>
+              <a:rPr lang="en-US" dirty="0"/>
+              <a:t> do </a:t>
+            </a:r>
+            <a:r>
+              <a:rPr lang="en-US" dirty="0" err="1"/>
+              <a:t>elemento</a:t>
+            </a:r>
+            <a:r>
+              <a:rPr lang="en-US" dirty="0"/>
+              <a:t> no DOM no </a:t>
+            </a:r>
+            <a:r>
+              <a:rPr lang="en-US" dirty="0" err="1"/>
+              <a:t>momento</a:t>
+            </a:r>
+            <a:r>
+              <a:rPr lang="en-US" dirty="0"/>
+              <a:t> que o </a:t>
+            </a:r>
+            <a:r>
+              <a:rPr lang="en-US" dirty="0" err="1"/>
+              <a:t>evento</a:t>
+            </a:r>
+            <a:r>
+              <a:rPr lang="en-US" dirty="0"/>
+              <a:t> é </a:t>
+            </a:r>
+            <a:r>
+              <a:rPr lang="en-US" dirty="0" err="1"/>
+              <a:t>disparado</a:t>
+            </a:r>
+            <a:r>
+              <a:rPr lang="en-US" dirty="0"/>
+              <a:t>, </a:t>
+            </a:r>
+            <a:r>
+              <a:rPr lang="en-US" dirty="0" err="1"/>
+              <a:t>assim</a:t>
+            </a:r>
+            <a:r>
+              <a:rPr lang="en-US" dirty="0"/>
+              <a:t> </a:t>
+            </a:r>
+            <a:r>
+              <a:rPr lang="en-US" dirty="0" err="1"/>
+              <a:t>podemos</a:t>
+            </a:r>
+            <a:r>
+              <a:rPr lang="en-US" dirty="0"/>
+              <a:t> </a:t>
+            </a:r>
+            <a:r>
+              <a:rPr lang="en-US" dirty="0" err="1"/>
+              <a:t>ter</a:t>
+            </a:r>
+            <a:r>
+              <a:rPr lang="en-US" dirty="0"/>
+              <a:t> </a:t>
+            </a:r>
+            <a:r>
+              <a:rPr lang="en-US" dirty="0" err="1"/>
+              <a:t>acesso</a:t>
+            </a:r>
+            <a:r>
+              <a:rPr lang="en-US" dirty="0"/>
+              <a:t> </a:t>
+            </a:r>
+            <a:r>
+              <a:rPr lang="en-US" dirty="0" err="1"/>
+              <a:t>ao</a:t>
+            </a:r>
+            <a:r>
+              <a:rPr lang="en-US" dirty="0"/>
+              <a:t> value (</a:t>
+            </a:r>
+            <a:r>
+              <a:rPr lang="en-US" dirty="0" err="1"/>
+              <a:t>target.value</a:t>
+            </a:r>
+            <a:r>
+              <a:rPr lang="en-US" dirty="0"/>
+              <a:t>) do campo para </a:t>
+            </a:r>
+            <a:r>
+              <a:rPr lang="en-US" dirty="0" err="1"/>
+              <a:t>atualizar</a:t>
+            </a:r>
+            <a:r>
+              <a:rPr lang="en-US" dirty="0"/>
+              <a:t> a nova </a:t>
+            </a:r>
+            <a:r>
+              <a:rPr lang="en-US" dirty="0" err="1"/>
+              <a:t>variável</a:t>
+            </a:r>
+            <a:r>
+              <a:rPr lang="en-US" dirty="0"/>
+              <a:t>.</a:t>
+            </a:r>
+          </a:p>
+          <a:p>
+            <a:pPr marL="1485900" lvl="2" indent="-342900">
+              <a:buFont typeface="Arial" panose="020B0604020202020204" pitchFamily="34" charset="0"/>
+              <a:buChar char="•"/>
+            </a:pPr>
+            <a:r>
+              <a:rPr lang="en-US" dirty="0" err="1"/>
+              <a:t>Importante</a:t>
+            </a:r>
+            <a:r>
+              <a:rPr lang="en-US" dirty="0"/>
+              <a:t> </a:t>
+            </a:r>
+            <a:r>
+              <a:rPr lang="en-US" dirty="0" err="1"/>
+              <a:t>lembrar</a:t>
+            </a:r>
+            <a:r>
+              <a:rPr lang="en-US" dirty="0"/>
+              <a:t> que </a:t>
+            </a:r>
+            <a:r>
+              <a:rPr lang="en-US" dirty="0" err="1"/>
+              <a:t>quando</a:t>
+            </a:r>
+            <a:r>
+              <a:rPr lang="en-US" dirty="0"/>
+              <a:t> </a:t>
+            </a:r>
+            <a:r>
+              <a:rPr lang="en-US" dirty="0" err="1"/>
+              <a:t>possuímos</a:t>
+            </a:r>
+            <a:r>
+              <a:rPr lang="en-US" dirty="0"/>
+              <a:t> um </a:t>
+            </a:r>
+            <a:r>
+              <a:rPr lang="en-US" b="1" dirty="0"/>
+              <a:t>$event </a:t>
+            </a:r>
+            <a:r>
+              <a:rPr lang="en-US" dirty="0" err="1"/>
+              <a:t>como</a:t>
+            </a:r>
+            <a:r>
+              <a:rPr lang="en-US" dirty="0"/>
+              <a:t> </a:t>
+            </a:r>
+            <a:r>
+              <a:rPr lang="en-US" dirty="0" err="1"/>
+              <a:t>parâmetro</a:t>
+            </a:r>
+            <a:r>
+              <a:rPr lang="en-US" dirty="0"/>
+              <a:t>, </a:t>
+            </a:r>
+            <a:r>
+              <a:rPr lang="en-US" dirty="0" err="1"/>
+              <a:t>devemos</a:t>
+            </a:r>
+            <a:r>
+              <a:rPr lang="en-US" dirty="0"/>
+              <a:t> </a:t>
+            </a:r>
+            <a:r>
+              <a:rPr lang="en-US" dirty="0" err="1"/>
+              <a:t>receber</a:t>
+            </a:r>
+            <a:r>
+              <a:rPr lang="en-US" dirty="0"/>
+              <a:t> no </a:t>
+            </a:r>
+            <a:r>
+              <a:rPr lang="en-US" dirty="0" err="1"/>
+              <a:t>nosso</a:t>
+            </a:r>
+            <a:r>
+              <a:rPr lang="en-US" dirty="0"/>
+              <a:t> </a:t>
+            </a:r>
+            <a:r>
+              <a:rPr lang="en-US" dirty="0" err="1"/>
+              <a:t>método</a:t>
+            </a:r>
+            <a:r>
+              <a:rPr lang="en-US" dirty="0"/>
+              <a:t> </a:t>
+            </a:r>
+            <a:r>
+              <a:rPr lang="en-US" dirty="0" err="1"/>
+              <a:t>como</a:t>
+            </a:r>
+            <a:r>
+              <a:rPr lang="en-US" dirty="0"/>
+              <a:t> </a:t>
+            </a:r>
+            <a:r>
+              <a:rPr lang="en-US" dirty="0" err="1"/>
+              <a:t>parâmetro</a:t>
+            </a:r>
+            <a:r>
+              <a:rPr lang="en-US" dirty="0"/>
+              <a:t> </a:t>
+            </a:r>
+            <a:r>
+              <a:rPr lang="en-US" dirty="0" err="1"/>
+              <a:t>uma</a:t>
+            </a:r>
+            <a:r>
+              <a:rPr lang="en-US" dirty="0"/>
+              <a:t> </a:t>
+            </a:r>
+            <a:r>
+              <a:rPr lang="en-US" dirty="0" err="1"/>
+              <a:t>variável</a:t>
+            </a:r>
+            <a:r>
+              <a:rPr lang="en-US" dirty="0"/>
+              <a:t> do </a:t>
+            </a:r>
+            <a:r>
+              <a:rPr lang="en-US" dirty="0" err="1"/>
+              <a:t>tipo</a:t>
+            </a:r>
+            <a:r>
+              <a:rPr lang="en-US" dirty="0"/>
+              <a:t> </a:t>
+            </a:r>
+            <a:r>
+              <a:rPr lang="en-US" b="1" dirty="0"/>
+              <a:t>Event</a:t>
+            </a:r>
+            <a:r>
+              <a:rPr lang="en-US" dirty="0"/>
+              <a:t>.</a:t>
+            </a:r>
+          </a:p>
+          <a:p>
+            <a:pPr marL="1028700" lvl="1" indent="-342900">
               <a:buFont typeface="Arial" panose="020B0604020202020204" pitchFamily="34" charset="0"/>
               <a:buChar char="•"/>
             </a:pPr>
@@ -7904,6 +9435,553 @@
           <a:bodyPr/>
           <a:lstStyle/>
           <a:p>
+            <a:pPr marL="342900" indent="-342900">
+              <a:buFont typeface="Arial" panose="020B0604020202020204" pitchFamily="34" charset="0"/>
+              <a:buChar char="•"/>
+            </a:pPr>
+            <a:r>
+              <a:rPr lang="en-US" dirty="0"/>
+              <a:t>O Angular </a:t>
+            </a:r>
+            <a:r>
+              <a:rPr lang="en-US" dirty="0" err="1"/>
+              <a:t>também</a:t>
+            </a:r>
+            <a:r>
+              <a:rPr lang="en-US" dirty="0"/>
+              <a:t> </a:t>
+            </a:r>
+            <a:r>
+              <a:rPr lang="en-US" dirty="0" err="1"/>
+              <a:t>possui</a:t>
+            </a:r>
+            <a:r>
+              <a:rPr lang="en-US" dirty="0"/>
+              <a:t> </a:t>
+            </a:r>
+            <a:r>
+              <a:rPr lang="en-US" dirty="0" err="1"/>
+              <a:t>uma</a:t>
+            </a:r>
+            <a:r>
+              <a:rPr lang="en-US" dirty="0"/>
+              <a:t> </a:t>
+            </a:r>
+            <a:r>
+              <a:rPr lang="en-US" dirty="0" err="1"/>
+              <a:t>propriedade</a:t>
+            </a:r>
+            <a:r>
+              <a:rPr lang="en-US" dirty="0"/>
+              <a:t> </a:t>
+            </a:r>
+            <a:r>
+              <a:rPr lang="en-US" dirty="0" err="1"/>
+              <a:t>chamada</a:t>
+            </a:r>
+            <a:r>
+              <a:rPr lang="en-US" dirty="0"/>
+              <a:t> </a:t>
+            </a:r>
+            <a:r>
+              <a:rPr lang="en-US" b="1" dirty="0" err="1"/>
+              <a:t>ngModel</a:t>
+            </a:r>
+            <a:r>
+              <a:rPr lang="en-US" dirty="0"/>
+              <a:t>, que é a </a:t>
+            </a:r>
+            <a:r>
+              <a:rPr lang="en-US" dirty="0" err="1"/>
+              <a:t>representação</a:t>
+            </a:r>
+            <a:r>
+              <a:rPr lang="en-US" dirty="0"/>
+              <a:t> de </a:t>
+            </a:r>
+            <a:r>
+              <a:rPr lang="en-US" dirty="0" err="1"/>
+              <a:t>uma</a:t>
+            </a:r>
+            <a:r>
+              <a:rPr lang="en-US" dirty="0"/>
+              <a:t> </a:t>
+            </a:r>
+            <a:r>
+              <a:rPr lang="en-US" dirty="0" err="1"/>
+              <a:t>entidade</a:t>
+            </a:r>
+            <a:r>
+              <a:rPr lang="en-US" dirty="0"/>
+              <a:t>, que </a:t>
+            </a:r>
+            <a:r>
+              <a:rPr lang="en-US" dirty="0" err="1"/>
+              <a:t>pode</a:t>
+            </a:r>
+            <a:r>
+              <a:rPr lang="en-US" dirty="0"/>
+              <a:t> </a:t>
+            </a:r>
+            <a:r>
+              <a:rPr lang="en-US" dirty="0" err="1"/>
+              <a:t>ser</a:t>
+            </a:r>
+            <a:r>
+              <a:rPr lang="en-US" dirty="0"/>
+              <a:t> um </a:t>
+            </a:r>
+            <a:r>
+              <a:rPr lang="en-US" dirty="0" err="1"/>
+              <a:t>atributo</a:t>
+            </a:r>
+            <a:r>
+              <a:rPr lang="en-US" dirty="0"/>
+              <a:t> simples </a:t>
+            </a:r>
+            <a:r>
+              <a:rPr lang="en-US" dirty="0" err="1"/>
+              <a:t>como</a:t>
+            </a:r>
+            <a:r>
+              <a:rPr lang="en-US" dirty="0"/>
+              <a:t> </a:t>
+            </a:r>
+            <a:r>
+              <a:rPr lang="en-US" dirty="0" err="1"/>
+              <a:t>uma</a:t>
+            </a:r>
+            <a:r>
+              <a:rPr lang="en-US" dirty="0"/>
+              <a:t> string </a:t>
+            </a:r>
+            <a:r>
+              <a:rPr lang="en-US" dirty="0" err="1"/>
+              <a:t>ou</a:t>
+            </a:r>
+            <a:r>
+              <a:rPr lang="en-US" dirty="0"/>
+              <a:t> </a:t>
+            </a:r>
+            <a:r>
+              <a:rPr lang="en-US" dirty="0" err="1"/>
+              <a:t>até</a:t>
+            </a:r>
+            <a:r>
+              <a:rPr lang="en-US" dirty="0"/>
+              <a:t> </a:t>
+            </a:r>
+            <a:r>
+              <a:rPr lang="en-US" dirty="0" err="1"/>
+              <a:t>mesmo</a:t>
+            </a:r>
+            <a:r>
+              <a:rPr lang="en-US" dirty="0"/>
+              <a:t> um </a:t>
+            </a:r>
+            <a:r>
+              <a:rPr lang="en-US" dirty="0" err="1"/>
+              <a:t>objeto</a:t>
+            </a:r>
+            <a:r>
+              <a:rPr lang="en-US" dirty="0"/>
+              <a:t>.</a:t>
+            </a:r>
+          </a:p>
+          <a:p>
+            <a:pPr marL="342900" indent="-342900">
+              <a:buFont typeface="Arial" panose="020B0604020202020204" pitchFamily="34" charset="0"/>
+              <a:buChar char="•"/>
+            </a:pPr>
+            <a:r>
+              <a:rPr lang="en-US" dirty="0"/>
+              <a:t>O </a:t>
+            </a:r>
+            <a:r>
+              <a:rPr lang="en-US" dirty="0" err="1"/>
+              <a:t>ngModel</a:t>
+            </a:r>
+            <a:r>
+              <a:rPr lang="en-US" dirty="0"/>
+              <a:t> </a:t>
+            </a:r>
+            <a:r>
+              <a:rPr lang="en-US" dirty="0" err="1"/>
+              <a:t>também</a:t>
+            </a:r>
+            <a:r>
+              <a:rPr lang="en-US" dirty="0"/>
+              <a:t> </a:t>
+            </a:r>
+            <a:r>
+              <a:rPr lang="en-US" dirty="0" err="1"/>
+              <a:t>possui</a:t>
+            </a:r>
+            <a:r>
+              <a:rPr lang="en-US" dirty="0"/>
+              <a:t> um </a:t>
+            </a:r>
+            <a:r>
+              <a:rPr lang="en-US" dirty="0" err="1"/>
+              <a:t>evento</a:t>
+            </a:r>
+            <a:r>
+              <a:rPr lang="en-US" dirty="0"/>
+              <a:t> </a:t>
+            </a:r>
+            <a:r>
+              <a:rPr lang="en-US" dirty="0" err="1"/>
+              <a:t>chamado</a:t>
+            </a:r>
+            <a:r>
+              <a:rPr lang="en-US" dirty="0"/>
+              <a:t> </a:t>
+            </a:r>
+            <a:r>
+              <a:rPr lang="en-US" b="1" dirty="0" err="1"/>
+              <a:t>ngModelChange</a:t>
+            </a:r>
+            <a:r>
+              <a:rPr lang="en-US" dirty="0"/>
+              <a:t>, que </a:t>
+            </a:r>
+            <a:r>
+              <a:rPr lang="en-US" dirty="0" err="1"/>
+              <a:t>fica</a:t>
+            </a:r>
+            <a:r>
+              <a:rPr lang="en-US" dirty="0"/>
+              <a:t> </a:t>
+            </a:r>
+            <a:r>
+              <a:rPr lang="en-US" dirty="0" err="1"/>
+              <a:t>ouvindo</a:t>
+            </a:r>
+            <a:r>
+              <a:rPr lang="en-US" dirty="0"/>
+              <a:t> </a:t>
+            </a:r>
+            <a:r>
+              <a:rPr lang="en-US" dirty="0" err="1"/>
+              <a:t>quando</a:t>
+            </a:r>
+            <a:r>
+              <a:rPr lang="en-US" dirty="0"/>
+              <a:t> o campo é </a:t>
+            </a:r>
+            <a:r>
+              <a:rPr lang="en-US" dirty="0" err="1"/>
+              <a:t>atualizado</a:t>
+            </a:r>
+            <a:r>
+              <a:rPr lang="en-US" dirty="0"/>
+              <a:t>.</a:t>
+            </a:r>
+          </a:p>
+          <a:p>
+            <a:pPr marL="342900" indent="-342900">
+              <a:buFont typeface="Arial" panose="020B0604020202020204" pitchFamily="34" charset="0"/>
+              <a:buChar char="•"/>
+            </a:pPr>
+            <a:r>
+              <a:rPr lang="en-US" dirty="0"/>
+              <a:t>O </a:t>
+            </a:r>
+            <a:r>
+              <a:rPr lang="en-US" dirty="0" err="1"/>
+              <a:t>ngModelChange</a:t>
+            </a:r>
+            <a:r>
+              <a:rPr lang="en-US" dirty="0"/>
+              <a:t>, </a:t>
+            </a:r>
+            <a:r>
+              <a:rPr lang="en-US" dirty="0" err="1"/>
+              <a:t>não</a:t>
+            </a:r>
+            <a:r>
+              <a:rPr lang="en-US" dirty="0"/>
+              <a:t> </a:t>
+            </a:r>
+            <a:r>
+              <a:rPr lang="en-US" dirty="0" err="1"/>
+              <a:t>precisa</a:t>
+            </a:r>
+            <a:r>
+              <a:rPr lang="en-US" dirty="0"/>
+              <a:t> </a:t>
+            </a:r>
+            <a:r>
+              <a:rPr lang="en-US" dirty="0" err="1"/>
+              <a:t>pegar</a:t>
+            </a:r>
+            <a:r>
+              <a:rPr lang="en-US" dirty="0"/>
+              <a:t> o </a:t>
+            </a:r>
+            <a:r>
+              <a:rPr lang="en-US" dirty="0" err="1"/>
+              <a:t>target.value</a:t>
+            </a:r>
+            <a:r>
+              <a:rPr lang="en-US" dirty="0"/>
+              <a:t>, </a:t>
+            </a:r>
+            <a:r>
+              <a:rPr lang="en-US" dirty="0" err="1"/>
+              <a:t>pois</a:t>
+            </a:r>
+            <a:r>
+              <a:rPr lang="en-US" dirty="0"/>
+              <a:t> o angular ja </a:t>
+            </a:r>
+            <a:r>
+              <a:rPr lang="en-US" dirty="0" err="1"/>
+              <a:t>sabe</a:t>
+            </a:r>
+            <a:r>
+              <a:rPr lang="en-US" dirty="0"/>
+              <a:t> </a:t>
+            </a:r>
+            <a:r>
+              <a:rPr lang="en-US" dirty="0" err="1"/>
+              <a:t>obter</a:t>
+            </a:r>
+            <a:r>
+              <a:rPr lang="en-US" dirty="0"/>
+              <a:t> o value do </a:t>
+            </a:r>
+            <a:r>
+              <a:rPr lang="en-US" dirty="0" err="1"/>
+              <a:t>evento</a:t>
+            </a:r>
+            <a:r>
+              <a:rPr lang="en-US" dirty="0"/>
+              <a:t>.</a:t>
+            </a:r>
+          </a:p>
+          <a:p>
+            <a:pPr marL="1028700" lvl="1" indent="-342900">
+              <a:buFont typeface="Arial" panose="020B0604020202020204" pitchFamily="34" charset="0"/>
+              <a:buChar char="•"/>
+            </a:pPr>
+            <a:r>
+              <a:rPr lang="en-US" dirty="0" err="1"/>
+              <a:t>Exemplo</a:t>
+            </a:r>
+            <a:r>
+              <a:rPr lang="en-US" dirty="0"/>
+              <a:t>: &lt;input type=“text” </a:t>
+            </a:r>
+            <a:r>
+              <a:rPr lang="en-US" b="1" dirty="0"/>
+              <a:t>[</a:t>
+            </a:r>
+            <a:r>
+              <a:rPr lang="en-US" b="1" dirty="0" err="1"/>
+              <a:t>ngModel</a:t>
+            </a:r>
+            <a:r>
+              <a:rPr lang="en-US" b="1" dirty="0"/>
+              <a:t>]=“</a:t>
+            </a:r>
+            <a:r>
+              <a:rPr lang="en-US" b="1" dirty="0" err="1"/>
+              <a:t>nome</a:t>
+            </a:r>
+            <a:r>
+              <a:rPr lang="en-US" b="1" dirty="0"/>
+              <a:t>” (</a:t>
+            </a:r>
+            <a:r>
+              <a:rPr lang="en-US" b="1" dirty="0" err="1"/>
+              <a:t>ngModelChange</a:t>
+            </a:r>
+            <a:r>
+              <a:rPr lang="en-US" b="1" dirty="0"/>
+              <a:t>)=“</a:t>
+            </a:r>
+            <a:r>
+              <a:rPr lang="en-US" b="1" dirty="0" err="1"/>
+              <a:t>nome</a:t>
+            </a:r>
+            <a:r>
+              <a:rPr lang="en-US" b="1" dirty="0"/>
+              <a:t> = $event”</a:t>
+            </a:r>
+            <a:r>
+              <a:rPr lang="en-US" dirty="0"/>
+              <a:t>/&gt;</a:t>
+            </a:r>
+          </a:p>
+          <a:p>
+            <a:pPr marL="342900" indent="-342900">
+              <a:buFont typeface="Arial" panose="020B0604020202020204" pitchFamily="34" charset="0"/>
+              <a:buChar char="•"/>
+            </a:pPr>
+            <a:r>
+              <a:rPr lang="en-US" dirty="0" err="1"/>
+              <a:t>Esse</a:t>
+            </a:r>
+            <a:r>
+              <a:rPr lang="en-US" dirty="0"/>
+              <a:t> </a:t>
+            </a:r>
+            <a:r>
+              <a:rPr lang="en-US" dirty="0" err="1"/>
+              <a:t>exemplo</a:t>
+            </a:r>
+            <a:r>
+              <a:rPr lang="en-US" dirty="0"/>
+              <a:t> </a:t>
+            </a:r>
+            <a:r>
+              <a:rPr lang="en-US" dirty="0" err="1"/>
+              <a:t>tem</a:t>
+            </a:r>
+            <a:r>
+              <a:rPr lang="en-US" dirty="0"/>
+              <a:t> a </a:t>
+            </a:r>
+            <a:r>
+              <a:rPr lang="en-US" dirty="0" err="1"/>
+              <a:t>mesma</a:t>
+            </a:r>
+            <a:r>
+              <a:rPr lang="en-US" dirty="0"/>
+              <a:t> </a:t>
+            </a:r>
+            <a:r>
+              <a:rPr lang="en-US" dirty="0" err="1"/>
+              <a:t>funcionalidade</a:t>
+            </a:r>
+            <a:r>
+              <a:rPr lang="en-US" dirty="0"/>
+              <a:t> do </a:t>
+            </a:r>
+            <a:r>
+              <a:rPr lang="en-US" dirty="0" err="1"/>
+              <a:t>exemplo</a:t>
+            </a:r>
+            <a:r>
+              <a:rPr lang="en-US" dirty="0"/>
+              <a:t> anterior, a </a:t>
+            </a:r>
+            <a:r>
+              <a:rPr lang="en-US" dirty="0" err="1"/>
+              <a:t>única</a:t>
+            </a:r>
+            <a:r>
+              <a:rPr lang="en-US" dirty="0"/>
+              <a:t> </a:t>
+            </a:r>
+            <a:r>
+              <a:rPr lang="en-US" dirty="0" err="1"/>
+              <a:t>diferença</a:t>
+            </a:r>
+            <a:r>
+              <a:rPr lang="en-US" dirty="0"/>
+              <a:t> é </a:t>
+            </a:r>
+            <a:r>
+              <a:rPr lang="en-US" dirty="0" err="1"/>
+              <a:t>não</a:t>
+            </a:r>
+            <a:r>
+              <a:rPr lang="en-US" dirty="0"/>
+              <a:t> </a:t>
+            </a:r>
+            <a:r>
+              <a:rPr lang="en-US" dirty="0" err="1"/>
+              <a:t>precisar</a:t>
+            </a:r>
+            <a:r>
+              <a:rPr lang="en-US" dirty="0"/>
+              <a:t> do </a:t>
+            </a:r>
+            <a:r>
+              <a:rPr lang="en-US" dirty="0" err="1"/>
+              <a:t>target.value</a:t>
+            </a:r>
+            <a:r>
+              <a:rPr lang="en-US" dirty="0"/>
+              <a:t>.</a:t>
+            </a:r>
+          </a:p>
+          <a:p>
+            <a:pPr marL="342900" indent="-342900">
+              <a:buFont typeface="Arial" panose="020B0604020202020204" pitchFamily="34" charset="0"/>
+              <a:buChar char="•"/>
+            </a:pPr>
+            <a:r>
+              <a:rPr lang="en-US" dirty="0" err="1"/>
+              <a:t>Quando</a:t>
+            </a:r>
+            <a:r>
+              <a:rPr lang="en-US" dirty="0"/>
+              <a:t> </a:t>
+            </a:r>
+            <a:r>
+              <a:rPr lang="en-US" dirty="0" err="1"/>
+              <a:t>utilizamos</a:t>
+            </a:r>
+            <a:r>
+              <a:rPr lang="en-US" dirty="0"/>
+              <a:t> o </a:t>
+            </a:r>
+            <a:r>
+              <a:rPr lang="en-US" dirty="0" err="1"/>
+              <a:t>ngModule</a:t>
+            </a:r>
+            <a:r>
+              <a:rPr lang="en-US" dirty="0"/>
+              <a:t> </a:t>
+            </a:r>
+            <a:r>
+              <a:rPr lang="en-US" dirty="0" err="1"/>
+              <a:t>devemos</a:t>
+            </a:r>
+            <a:r>
+              <a:rPr lang="en-US" dirty="0"/>
+              <a:t> </a:t>
+            </a:r>
+            <a:r>
+              <a:rPr lang="en-US" dirty="0" err="1"/>
+              <a:t>importar</a:t>
+            </a:r>
+            <a:r>
+              <a:rPr lang="en-US" dirty="0"/>
+              <a:t> no </a:t>
+            </a:r>
+            <a:r>
+              <a:rPr lang="en-US" dirty="0" err="1"/>
+              <a:t>app.module</a:t>
+            </a:r>
+            <a:r>
+              <a:rPr lang="en-US" dirty="0"/>
+              <a:t> o </a:t>
+            </a:r>
+            <a:r>
+              <a:rPr lang="en-US" dirty="0" err="1"/>
+              <a:t>FormsModule</a:t>
+            </a:r>
+            <a:r>
+              <a:rPr lang="en-US" dirty="0"/>
+              <a:t>.</a:t>
+            </a:r>
+          </a:p>
+          <a:p>
+            <a:pPr marL="342900" indent="-342900">
+              <a:buFont typeface="Arial" panose="020B0604020202020204" pitchFamily="34" charset="0"/>
+              <a:buChar char="•"/>
+            </a:pPr>
+            <a:endParaRPr lang="en-US" dirty="0"/>
+          </a:p>
+          <a:p>
+            <a:pPr marL="1028700" lvl="1" indent="-342900">
+              <a:buFont typeface="Arial" panose="020B0604020202020204" pitchFamily="34" charset="0"/>
+              <a:buChar char="•"/>
+            </a:pPr>
             <a:endParaRPr lang="en-US" dirty="0"/>
           </a:p>
         </p:txBody>
@@ -7924,9 +10002,18 @@
           <a:lstStyle/>
           <a:p>
             <a:r>
-              <a:rPr lang="pt-BR" dirty="0"/>
-              <a:t>Nossa Aplicação Final</a:t>
-            </a:r>
+              <a:rPr lang="en-US" dirty="0" err="1"/>
+              <a:t>NgModel</a:t>
+            </a:r>
+            <a:r>
+              <a:rPr lang="en-US" dirty="0"/>
+              <a:t> e </a:t>
+            </a:r>
+            <a:r>
+              <a:rPr lang="en-US" dirty="0" err="1"/>
+              <a:t>NgModelChange</a:t>
+            </a:r>
+            <a:endParaRPr lang="pt-BR" dirty="0"/>
           </a:p>
         </p:txBody>
       </p:sp>
@@ -7963,7 +10050,7 @@
     </p:spTree>
     <p:extLst>
       <p:ext uri="{BB962C8B-B14F-4D97-AF65-F5344CB8AC3E}">
-        <p14:creationId xmlns:p14="http://schemas.microsoft.com/office/powerpoint/2010/main" val="1963298545"/>
+        <p14:creationId xmlns:p14="http://schemas.microsoft.com/office/powerpoint/2010/main" val="1828719125"/>
       </p:ext>
     </p:extLst>
   </p:cSld>
@@ -7995,23 +10082,15 @@
       </p:grpSpPr>
       <p:sp>
         <p:nvSpPr>
-          <p:cNvPr id="4" name="Slide Number Placeholder 3"/>
+          <p:cNvPr id="2" name="Slide Number Placeholder 1"/>
           <p:cNvSpPr>
             <a:spLocks noGrp="1"/>
           </p:cNvSpPr>
           <p:nvPr>
-            <p:ph type="sldNum" sz="quarter" idx="4294967295"/>
+            <p:ph type="sldNum" sz="quarter" idx="12"/>
           </p:nvPr>
         </p:nvSpPr>
-        <p:spPr>
-          <a:xfrm>
-            <a:off x="11695113" y="6356350"/>
-            <a:ext cx="496887" cy="365125"/>
-          </a:xfrm>
-          <a:prstGeom prst="rect">
-            <a:avLst/>
-          </a:prstGeom>
-        </p:spPr>
+        <p:spPr/>
         <p:txBody>
           <a:bodyPr/>
           <a:lstStyle/>
@@ -8025,10 +10104,1958 @@
           </a:p>
         </p:txBody>
       </p:sp>
+      <p:sp>
+        <p:nvSpPr>
+          <p:cNvPr id="5" name="Content Placeholder 4"/>
+          <p:cNvSpPr>
+            <a:spLocks noGrp="1"/>
+          </p:cNvSpPr>
+          <p:nvPr>
+            <p:ph idx="1"/>
+          </p:nvPr>
+        </p:nvSpPr>
+        <p:spPr/>
+        <p:txBody>
+          <a:bodyPr/>
+          <a:lstStyle/>
+          <a:p>
+            <a:pPr marL="342900" indent="-342900">
+              <a:buFont typeface="Arial" panose="020B0604020202020204" pitchFamily="34" charset="0"/>
+              <a:buChar char="•"/>
+            </a:pPr>
+            <a:r>
+              <a:rPr lang="en-US" dirty="0" err="1"/>
+              <a:t>Quando</a:t>
+            </a:r>
+            <a:r>
+              <a:rPr lang="en-US" dirty="0"/>
+              <a:t> </a:t>
+            </a:r>
+            <a:r>
+              <a:rPr lang="en-US" dirty="0" err="1"/>
+              <a:t>temos</a:t>
+            </a:r>
+            <a:r>
+              <a:rPr lang="en-US" dirty="0"/>
+              <a:t> um </a:t>
+            </a:r>
+            <a:r>
+              <a:rPr lang="en-US" dirty="0" err="1"/>
+              <a:t>formulário</a:t>
+            </a:r>
+            <a:r>
+              <a:rPr lang="en-US" dirty="0"/>
+              <a:t> com </a:t>
+            </a:r>
+            <a:r>
+              <a:rPr lang="en-US" dirty="0" err="1"/>
+              <a:t>diversos</a:t>
+            </a:r>
+            <a:r>
+              <a:rPr lang="en-US" dirty="0"/>
+              <a:t> </a:t>
+            </a:r>
+            <a:r>
+              <a:rPr lang="en-US" dirty="0" err="1"/>
+              <a:t>campos</a:t>
+            </a:r>
+            <a:r>
+              <a:rPr lang="en-US" dirty="0"/>
+              <a:t>, </a:t>
+            </a:r>
+            <a:r>
+              <a:rPr lang="en-US" dirty="0" err="1"/>
+              <a:t>ficará</a:t>
+            </a:r>
+            <a:r>
+              <a:rPr lang="en-US" dirty="0"/>
+              <a:t> </a:t>
+            </a:r>
+            <a:r>
+              <a:rPr lang="en-US" dirty="0" err="1"/>
+              <a:t>muito</a:t>
+            </a:r>
+            <a:r>
+              <a:rPr lang="en-US" dirty="0"/>
+              <a:t> </a:t>
+            </a:r>
+            <a:r>
+              <a:rPr lang="en-US" dirty="0" err="1"/>
+              <a:t>complexo</a:t>
+            </a:r>
+            <a:r>
+              <a:rPr lang="en-US" dirty="0"/>
+              <a:t> </a:t>
+            </a:r>
+            <a:r>
+              <a:rPr lang="en-US" dirty="0" err="1"/>
+              <a:t>utilizarmos</a:t>
+            </a:r>
+            <a:r>
+              <a:rPr lang="en-US" dirty="0"/>
+              <a:t> </a:t>
+            </a:r>
+            <a:r>
+              <a:rPr lang="en-US" dirty="0" err="1"/>
+              <a:t>os</a:t>
+            </a:r>
+            <a:r>
+              <a:rPr lang="en-US" dirty="0"/>
+              <a:t> </a:t>
+            </a:r>
+            <a:r>
+              <a:rPr lang="en-US" dirty="0" err="1"/>
+              <a:t>exemplos</a:t>
+            </a:r>
+            <a:r>
+              <a:rPr lang="en-US" dirty="0"/>
+              <a:t> </a:t>
+            </a:r>
+            <a:r>
+              <a:rPr lang="en-US" dirty="0" err="1"/>
+              <a:t>anteriores</a:t>
+            </a:r>
+            <a:r>
+              <a:rPr lang="en-US" dirty="0"/>
+              <a:t> do property binding + event </a:t>
+            </a:r>
+            <a:r>
+              <a:rPr lang="en-US" dirty="0" err="1"/>
+              <a:t>bing</a:t>
+            </a:r>
+            <a:r>
+              <a:rPr lang="en-US" dirty="0"/>
+              <a:t> e </a:t>
+            </a:r>
+            <a:r>
+              <a:rPr lang="en-US" dirty="0" err="1"/>
+              <a:t>ngModel</a:t>
+            </a:r>
+            <a:r>
+              <a:rPr lang="en-US" dirty="0"/>
+              <a:t> + </a:t>
+            </a:r>
+            <a:r>
+              <a:rPr lang="en-US" dirty="0" err="1"/>
+              <a:t>ngModelChange</a:t>
+            </a:r>
+            <a:r>
+              <a:rPr lang="en-US" dirty="0"/>
+              <a:t>.</a:t>
+            </a:r>
+          </a:p>
+          <a:p>
+            <a:pPr marL="342900" indent="-342900">
+              <a:buFont typeface="Arial" panose="020B0604020202020204" pitchFamily="34" charset="0"/>
+              <a:buChar char="•"/>
+            </a:pPr>
+            <a:r>
+              <a:rPr lang="en-US" dirty="0"/>
+              <a:t>Para </a:t>
+            </a:r>
+            <a:r>
+              <a:rPr lang="en-US" dirty="0" err="1"/>
+              <a:t>facilitar</a:t>
+            </a:r>
+            <a:r>
+              <a:rPr lang="en-US" dirty="0"/>
+              <a:t> a </a:t>
+            </a:r>
+            <a:r>
+              <a:rPr lang="en-US" dirty="0" err="1"/>
+              <a:t>vida</a:t>
+            </a:r>
+            <a:r>
+              <a:rPr lang="en-US" dirty="0"/>
+              <a:t> do </a:t>
+            </a:r>
+            <a:r>
+              <a:rPr lang="en-US" dirty="0" err="1"/>
+              <a:t>programador</a:t>
+            </a:r>
+            <a:r>
+              <a:rPr lang="en-US" dirty="0"/>
+              <a:t>, </a:t>
+            </a:r>
+            <a:r>
+              <a:rPr lang="en-US" dirty="0" err="1"/>
+              <a:t>vamos</a:t>
+            </a:r>
+            <a:r>
+              <a:rPr lang="en-US" dirty="0"/>
+              <a:t> </a:t>
+            </a:r>
+            <a:r>
+              <a:rPr lang="en-US" dirty="0" err="1"/>
+              <a:t>juntar</a:t>
+            </a:r>
+            <a:r>
+              <a:rPr lang="en-US" dirty="0"/>
+              <a:t> o property binding com o event binding.</a:t>
+            </a:r>
+          </a:p>
+          <a:p>
+            <a:pPr marL="1028700" lvl="1" indent="-342900">
+              <a:buFont typeface="Arial" panose="020B0604020202020204" pitchFamily="34" charset="0"/>
+              <a:buChar char="•"/>
+            </a:pPr>
+            <a:r>
+              <a:rPr lang="en-US" dirty="0" err="1"/>
+              <a:t>Exemplo</a:t>
+            </a:r>
+            <a:r>
+              <a:rPr lang="en-US" dirty="0"/>
+              <a:t>: &lt;input type=“text” </a:t>
+            </a:r>
+            <a:r>
+              <a:rPr lang="en-US" b="1" dirty="0"/>
+              <a:t>[(</a:t>
+            </a:r>
+            <a:r>
+              <a:rPr lang="en-US" b="1" dirty="0" err="1"/>
+              <a:t>ngModel</a:t>
+            </a:r>
+            <a:r>
+              <a:rPr lang="en-US" b="1" dirty="0"/>
+              <a:t>)]=“</a:t>
+            </a:r>
+            <a:r>
+              <a:rPr lang="en-US" b="1" dirty="0" err="1"/>
+              <a:t>nome</a:t>
+            </a:r>
+            <a:r>
+              <a:rPr lang="en-US" b="1" dirty="0"/>
+              <a:t>” </a:t>
+            </a:r>
+            <a:r>
+              <a:rPr lang="en-US" dirty="0"/>
+              <a:t>/&gt;</a:t>
+            </a:r>
+          </a:p>
+          <a:p>
+            <a:pPr marL="342900" indent="-342900">
+              <a:buFont typeface="Arial" panose="020B0604020202020204" pitchFamily="34" charset="0"/>
+              <a:buChar char="•"/>
+            </a:pPr>
+            <a:r>
+              <a:rPr lang="en-US" dirty="0"/>
+              <a:t>Para </a:t>
+            </a:r>
+            <a:r>
+              <a:rPr lang="en-US" dirty="0" err="1"/>
+              <a:t>lembrar</a:t>
+            </a:r>
+            <a:r>
+              <a:rPr lang="en-US" dirty="0"/>
+              <a:t> a </a:t>
+            </a:r>
+            <a:r>
+              <a:rPr lang="en-US" dirty="0" err="1"/>
+              <a:t>ordem</a:t>
+            </a:r>
+            <a:r>
+              <a:rPr lang="en-US" dirty="0"/>
+              <a:t> do [] e (), </a:t>
+            </a:r>
+            <a:r>
+              <a:rPr lang="en-US" dirty="0" err="1"/>
+              <a:t>chamamos</a:t>
+            </a:r>
+            <a:r>
+              <a:rPr lang="en-US" dirty="0"/>
+              <a:t> </a:t>
+            </a:r>
+            <a:r>
+              <a:rPr lang="en-US" dirty="0" err="1"/>
+              <a:t>essa</a:t>
+            </a:r>
+            <a:r>
+              <a:rPr lang="en-US" dirty="0"/>
+              <a:t> </a:t>
+            </a:r>
+            <a:r>
+              <a:rPr lang="en-US" dirty="0" err="1"/>
+              <a:t>sintaxe</a:t>
+            </a:r>
+            <a:r>
+              <a:rPr lang="en-US" dirty="0"/>
+              <a:t> de “Bananas in the box (Bananas </a:t>
+            </a:r>
+            <a:r>
+              <a:rPr lang="en-US" dirty="0" err="1"/>
+              <a:t>na</a:t>
+            </a:r>
+            <a:r>
+              <a:rPr lang="en-US" dirty="0"/>
+              <a:t> </a:t>
+            </a:r>
+            <a:r>
+              <a:rPr lang="en-US" dirty="0" err="1"/>
+              <a:t>caixa</a:t>
+            </a:r>
+            <a:r>
+              <a:rPr lang="en-US" dirty="0"/>
+              <a:t>)”, </a:t>
+            </a:r>
+            <a:r>
+              <a:rPr lang="en-US" dirty="0" err="1"/>
+              <a:t>onde</a:t>
+            </a:r>
+            <a:r>
+              <a:rPr lang="en-US" dirty="0"/>
+              <a:t> </a:t>
+            </a:r>
+            <a:r>
+              <a:rPr lang="en-US" dirty="0" err="1"/>
+              <a:t>os</a:t>
+            </a:r>
+            <a:r>
+              <a:rPr lang="en-US" dirty="0"/>
+              <a:t> [] </a:t>
+            </a:r>
+            <a:r>
+              <a:rPr lang="en-US" dirty="0" err="1"/>
+              <a:t>lembram</a:t>
+            </a:r>
+            <a:r>
+              <a:rPr lang="en-US" dirty="0"/>
+              <a:t> a Caixa e </a:t>
+            </a:r>
+            <a:r>
+              <a:rPr lang="en-US" dirty="0" err="1"/>
+              <a:t>os</a:t>
+            </a:r>
+            <a:r>
+              <a:rPr lang="en-US" dirty="0"/>
+              <a:t> () </a:t>
+            </a:r>
+            <a:r>
+              <a:rPr lang="en-US" dirty="0" err="1"/>
+              <a:t>lembram</a:t>
+            </a:r>
+            <a:r>
+              <a:rPr lang="en-US" dirty="0"/>
+              <a:t> as bananas.</a:t>
+            </a:r>
+          </a:p>
+          <a:p>
+            <a:pPr marL="342900" indent="-342900">
+              <a:buFont typeface="Arial" panose="020B0604020202020204" pitchFamily="34" charset="0"/>
+              <a:buChar char="•"/>
+            </a:pPr>
+            <a:endParaRPr lang="en-US" dirty="0"/>
+          </a:p>
+        </p:txBody>
+      </p:sp>
+      <p:sp>
+        <p:nvSpPr>
+          <p:cNvPr id="6" name="Title 5"/>
+          <p:cNvSpPr>
+            <a:spLocks noGrp="1"/>
+          </p:cNvSpPr>
+          <p:nvPr>
+            <p:ph type="title"/>
+          </p:nvPr>
+        </p:nvSpPr>
+        <p:spPr/>
+        <p:txBody>
+          <a:bodyPr/>
+          <a:lstStyle/>
+          <a:p>
+            <a:r>
+              <a:rPr lang="en-US" dirty="0"/>
+              <a:t>Two Way Binding – Bananas in the box</a:t>
+            </a:r>
+            <a:endParaRPr lang="pt-BR" dirty="0"/>
+          </a:p>
+        </p:txBody>
+      </p:sp>
+      <p:pic>
+        <p:nvPicPr>
+          <p:cNvPr id="4" name="Picture 3">
+            <a:extLst>
+              <a:ext uri="{FF2B5EF4-FFF2-40B4-BE49-F238E27FC236}">
+                <a16:creationId xmlns:a16="http://schemas.microsoft.com/office/drawing/2014/main" id="{4A9B1FB6-6BD7-4B61-9B1F-9A27C671EB8B}"/>
+              </a:ext>
+            </a:extLst>
+          </p:cNvPr>
+          <p:cNvPicPr>
+            <a:picLocks noChangeAspect="1"/>
+          </p:cNvPicPr>
+          <p:nvPr/>
+        </p:nvPicPr>
+        <p:blipFill>
+          <a:blip r:embed="rId2"/>
+          <a:stretch>
+            <a:fillRect/>
+          </a:stretch>
+        </p:blipFill>
+        <p:spPr>
+          <a:xfrm>
+            <a:off x="10690123" y="210236"/>
+            <a:ext cx="1359310" cy="1359310"/>
+          </a:xfrm>
+          <a:prstGeom prst="rect">
+            <a:avLst/>
+          </a:prstGeom>
+        </p:spPr>
+      </p:pic>
     </p:spTree>
     <p:extLst>
       <p:ext uri="{BB962C8B-B14F-4D97-AF65-F5344CB8AC3E}">
-        <p14:creationId xmlns:p14="http://schemas.microsoft.com/office/powerpoint/2010/main" val="857736654"/>
+        <p14:creationId xmlns:p14="http://schemas.microsoft.com/office/powerpoint/2010/main" val="926061486"/>
+      </p:ext>
+    </p:extLst>
+  </p:cSld>
+  <p:clrMapOvr>
+    <a:masterClrMapping/>
+  </p:clrMapOvr>
+  <p:transition>
+    <p:fade/>
+  </p:transition>
+</p:sld>
+</file>
+
+<file path=ppt/slides/slide7.xml><?xml version="1.0" encoding="utf-8"?>
+<p:sld xmlns:a="http://schemas.openxmlformats.org/drawingml/2006/main" xmlns:r="http://schemas.openxmlformats.org/officeDocument/2006/relationships" xmlns:p="http://schemas.openxmlformats.org/presentationml/2006/main">
+  <p:cSld>
+    <p:spTree>
+      <p:nvGrpSpPr>
+        <p:cNvPr id="1" name=""/>
+        <p:cNvGrpSpPr/>
+        <p:nvPr/>
+      </p:nvGrpSpPr>
+      <p:grpSpPr>
+        <a:xfrm>
+          <a:off x="0" y="0"/>
+          <a:ext cx="0" cy="0"/>
+          <a:chOff x="0" y="0"/>
+          <a:chExt cx="0" cy="0"/>
+        </a:xfrm>
+      </p:grpSpPr>
+      <p:sp>
+        <p:nvSpPr>
+          <p:cNvPr id="2" name="Slide Number Placeholder 1"/>
+          <p:cNvSpPr>
+            <a:spLocks noGrp="1"/>
+          </p:cNvSpPr>
+          <p:nvPr>
+            <p:ph type="sldNum" sz="quarter" idx="12"/>
+          </p:nvPr>
+        </p:nvSpPr>
+        <p:spPr/>
+        <p:txBody>
+          <a:bodyPr/>
+          <a:lstStyle/>
+          <a:p>
+            <a:fld id="{3847DB54-D037-B84F-B6F1-2E8DA40D09AD}" type="slidenum">
+              <a:rPr lang="en-US" smtClean="0"/>
+              <a:pPr/>
+              <a:t>7</a:t>
+            </a:fld>
+            <a:endParaRPr lang="en-US"/>
+          </a:p>
+        </p:txBody>
+      </p:sp>
+      <p:sp>
+        <p:nvSpPr>
+          <p:cNvPr id="5" name="Content Placeholder 4"/>
+          <p:cNvSpPr>
+            <a:spLocks noGrp="1"/>
+          </p:cNvSpPr>
+          <p:nvPr>
+            <p:ph idx="1"/>
+          </p:nvPr>
+        </p:nvSpPr>
+        <p:spPr/>
+        <p:txBody>
+          <a:bodyPr/>
+          <a:lstStyle/>
+          <a:p>
+            <a:pPr marL="342900" indent="-342900">
+              <a:buFont typeface="Arial" panose="020B0604020202020204" pitchFamily="34" charset="0"/>
+              <a:buChar char="•"/>
+            </a:pPr>
+            <a:r>
+              <a:rPr lang="en-US" dirty="0"/>
+              <a:t>Para </a:t>
+            </a:r>
+            <a:r>
+              <a:rPr lang="en-US" dirty="0" err="1"/>
+              <a:t>exemplificar</a:t>
+            </a:r>
+            <a:r>
+              <a:rPr lang="en-US" dirty="0"/>
+              <a:t> as 3 </a:t>
+            </a:r>
+            <a:r>
+              <a:rPr lang="en-US" dirty="0" err="1"/>
+              <a:t>formas</a:t>
+            </a:r>
+            <a:r>
+              <a:rPr lang="en-US" dirty="0"/>
+              <a:t> de </a:t>
+            </a:r>
+            <a:r>
+              <a:rPr lang="en-US" dirty="0" err="1"/>
+              <a:t>utilização</a:t>
+            </a:r>
+            <a:r>
+              <a:rPr lang="en-US" dirty="0"/>
+              <a:t> de Two Way Binding, </a:t>
+            </a:r>
+            <a:r>
+              <a:rPr lang="en-US" dirty="0" err="1"/>
+              <a:t>vamos</a:t>
+            </a:r>
+            <a:r>
+              <a:rPr lang="en-US" dirty="0"/>
+              <a:t> </a:t>
+            </a:r>
+            <a:r>
+              <a:rPr lang="en-US" dirty="0" err="1"/>
+              <a:t>criar</a:t>
+            </a:r>
+            <a:r>
+              <a:rPr lang="en-US" dirty="0"/>
+              <a:t> 3 </a:t>
+            </a:r>
+            <a:r>
+              <a:rPr lang="en-US" dirty="0" err="1"/>
+              <a:t>exemplos</a:t>
+            </a:r>
+            <a:r>
+              <a:rPr lang="en-US" dirty="0"/>
+              <a:t> simples </a:t>
+            </a:r>
+            <a:r>
+              <a:rPr lang="en-US" dirty="0" err="1"/>
+              <a:t>onde</a:t>
+            </a:r>
+            <a:r>
+              <a:rPr lang="en-US" dirty="0"/>
+              <a:t> </a:t>
+            </a:r>
+            <a:r>
+              <a:rPr lang="en-US" dirty="0" err="1"/>
+              <a:t>teremos</a:t>
+            </a:r>
+            <a:r>
+              <a:rPr lang="en-US" dirty="0"/>
+              <a:t> um campo que </a:t>
+            </a:r>
+            <a:r>
+              <a:rPr lang="en-US" dirty="0" err="1"/>
+              <a:t>irá</a:t>
+            </a:r>
+            <a:r>
+              <a:rPr lang="en-US" dirty="0"/>
+              <a:t> </a:t>
+            </a:r>
+            <a:r>
+              <a:rPr lang="en-US" dirty="0" err="1"/>
+              <a:t>atualizar</a:t>
+            </a:r>
+            <a:r>
+              <a:rPr lang="en-US" dirty="0"/>
+              <a:t> </a:t>
+            </a:r>
+            <a:r>
+              <a:rPr lang="en-US" dirty="0" err="1"/>
+              <a:t>nosso</a:t>
+            </a:r>
+            <a:r>
+              <a:rPr lang="en-US" dirty="0"/>
+              <a:t> template.</a:t>
+            </a:r>
+          </a:p>
+          <a:p>
+            <a:pPr marL="342900" indent="-342900">
+              <a:buFont typeface="Arial" panose="020B0604020202020204" pitchFamily="34" charset="0"/>
+              <a:buChar char="•"/>
+            </a:pPr>
+            <a:r>
+              <a:rPr lang="en-US" dirty="0"/>
+              <a:t>No </a:t>
+            </a:r>
+            <a:r>
+              <a:rPr lang="en-US" dirty="0" err="1"/>
+              <a:t>primeiro</a:t>
+            </a:r>
+            <a:r>
+              <a:rPr lang="en-US" dirty="0"/>
+              <a:t> </a:t>
+            </a:r>
+            <a:r>
+              <a:rPr lang="en-US" dirty="0" err="1"/>
+              <a:t>exemplo</a:t>
+            </a:r>
+            <a:r>
+              <a:rPr lang="en-US" dirty="0"/>
+              <a:t> </a:t>
+            </a:r>
+            <a:r>
+              <a:rPr lang="en-US" dirty="0" err="1"/>
+              <a:t>utilizando</a:t>
+            </a:r>
+            <a:r>
+              <a:rPr lang="en-US" dirty="0"/>
+              <a:t> o property binding e event binding de </a:t>
+            </a:r>
+            <a:r>
+              <a:rPr lang="en-US" dirty="0" err="1"/>
+              <a:t>formas</a:t>
+            </a:r>
+            <a:r>
+              <a:rPr lang="en-US" dirty="0"/>
+              <a:t> </a:t>
+            </a:r>
+            <a:r>
+              <a:rPr lang="en-US" dirty="0" err="1"/>
+              <a:t>separadas</a:t>
+            </a:r>
+            <a:r>
+              <a:rPr lang="en-US" dirty="0"/>
+              <a:t>, </a:t>
+            </a:r>
+            <a:r>
+              <a:rPr lang="en-US" dirty="0" err="1"/>
+              <a:t>vamos</a:t>
+            </a:r>
+            <a:r>
+              <a:rPr lang="en-US" dirty="0"/>
+              <a:t> </a:t>
+            </a:r>
+            <a:r>
+              <a:rPr lang="en-US" dirty="0" err="1"/>
+              <a:t>criar</a:t>
+            </a:r>
+            <a:r>
+              <a:rPr lang="en-US" dirty="0"/>
+              <a:t> um </a:t>
+            </a:r>
+            <a:r>
+              <a:rPr lang="en-US" dirty="0" err="1"/>
+              <a:t>componente</a:t>
+            </a:r>
+            <a:r>
+              <a:rPr lang="en-US" dirty="0"/>
+              <a:t> </a:t>
+            </a:r>
+            <a:r>
+              <a:rPr lang="en-US" dirty="0" err="1"/>
+              <a:t>chamado</a:t>
+            </a:r>
+            <a:r>
+              <a:rPr lang="en-US" dirty="0"/>
+              <a:t> </a:t>
+            </a:r>
+            <a:r>
+              <a:rPr lang="en-US" dirty="0" err="1"/>
+              <a:t>primeiro</a:t>
+            </a:r>
+            <a:r>
+              <a:rPr lang="en-US" dirty="0"/>
+              <a:t>.</a:t>
+            </a:r>
+          </a:p>
+          <a:p>
+            <a:pPr marL="342900" indent="-342900">
+              <a:buFont typeface="Arial" panose="020B0604020202020204" pitchFamily="34" charset="0"/>
+              <a:buChar char="•"/>
+            </a:pPr>
+            <a:r>
+              <a:rPr lang="en-US" dirty="0"/>
+              <a:t>Na </a:t>
+            </a:r>
+            <a:r>
+              <a:rPr lang="en-US" dirty="0" err="1"/>
+              <a:t>classe</a:t>
+            </a:r>
+            <a:r>
+              <a:rPr lang="en-US" dirty="0"/>
+              <a:t> do </a:t>
+            </a:r>
+            <a:r>
+              <a:rPr lang="en-US" dirty="0" err="1"/>
+              <a:t>componente</a:t>
+            </a:r>
+            <a:r>
+              <a:rPr lang="en-US" dirty="0"/>
+              <a:t> </a:t>
+            </a:r>
+            <a:r>
+              <a:rPr lang="en-US" dirty="0" err="1"/>
+              <a:t>vamos</a:t>
+            </a:r>
+            <a:r>
+              <a:rPr lang="en-US" dirty="0"/>
+              <a:t> </a:t>
+            </a:r>
+            <a:r>
+              <a:rPr lang="en-US" dirty="0" err="1"/>
+              <a:t>criar</a:t>
+            </a:r>
+            <a:r>
+              <a:rPr lang="en-US" dirty="0"/>
+              <a:t> um </a:t>
+            </a:r>
+            <a:r>
+              <a:rPr lang="en-US" dirty="0" err="1"/>
+              <a:t>atributo</a:t>
+            </a:r>
+            <a:r>
+              <a:rPr lang="en-US" dirty="0"/>
+              <a:t> </a:t>
+            </a:r>
+            <a:r>
+              <a:rPr lang="en-US" dirty="0" err="1"/>
+              <a:t>nome</a:t>
+            </a:r>
+            <a:r>
+              <a:rPr lang="en-US" dirty="0"/>
+              <a:t> do </a:t>
+            </a:r>
+            <a:r>
+              <a:rPr lang="en-US" dirty="0" err="1"/>
+              <a:t>tipo</a:t>
+            </a:r>
+            <a:r>
+              <a:rPr lang="en-US" dirty="0"/>
+              <a:t> string e um </a:t>
+            </a:r>
+            <a:r>
+              <a:rPr lang="en-US" dirty="0" err="1"/>
+              <a:t>método</a:t>
+            </a:r>
+            <a:r>
+              <a:rPr lang="en-US" dirty="0"/>
+              <a:t> </a:t>
+            </a:r>
+            <a:r>
+              <a:rPr lang="en-US" dirty="0" err="1"/>
+              <a:t>chamado</a:t>
+            </a:r>
+            <a:r>
+              <a:rPr lang="en-US" dirty="0"/>
+              <a:t> </a:t>
+            </a:r>
+            <a:r>
+              <a:rPr lang="en-US" dirty="0" err="1"/>
+              <a:t>atualizaNome</a:t>
+            </a:r>
+            <a:r>
+              <a:rPr lang="en-US" dirty="0"/>
+              <a:t>.</a:t>
+            </a:r>
+          </a:p>
+          <a:p>
+            <a:pPr marL="342900" indent="-342900">
+              <a:buFont typeface="Arial" panose="020B0604020202020204" pitchFamily="34" charset="0"/>
+              <a:buChar char="•"/>
+            </a:pPr>
+            <a:r>
+              <a:rPr lang="en-US" dirty="0"/>
+              <a:t>Agora no template, </a:t>
+            </a:r>
+            <a:r>
+              <a:rPr lang="en-US" dirty="0" err="1"/>
+              <a:t>vamos</a:t>
+            </a:r>
+            <a:r>
+              <a:rPr lang="en-US" dirty="0"/>
+              <a:t> </a:t>
+            </a:r>
+            <a:r>
+              <a:rPr lang="en-US" dirty="0" err="1"/>
+              <a:t>utilizar</a:t>
+            </a:r>
+            <a:r>
+              <a:rPr lang="en-US" dirty="0"/>
+              <a:t> para </a:t>
+            </a:r>
+            <a:r>
+              <a:rPr lang="en-US" dirty="0" err="1"/>
+              <a:t>estilizar</a:t>
+            </a:r>
+            <a:r>
+              <a:rPr lang="en-US" dirty="0"/>
+              <a:t> o fluid jumbotron do bootstrap, </a:t>
+            </a:r>
+            <a:r>
+              <a:rPr lang="en-US" dirty="0" err="1"/>
+              <a:t>colocando</a:t>
+            </a:r>
+            <a:r>
+              <a:rPr lang="en-US" dirty="0"/>
+              <a:t> </a:t>
+            </a:r>
+            <a:r>
+              <a:rPr lang="en-US" dirty="0" err="1"/>
+              <a:t>dentro</a:t>
+            </a:r>
+            <a:r>
+              <a:rPr lang="en-US" dirty="0"/>
+              <a:t> dele um campo de input com </a:t>
+            </a:r>
+            <a:r>
+              <a:rPr lang="en-US" dirty="0" err="1"/>
+              <a:t>uma</a:t>
+            </a:r>
+            <a:r>
+              <a:rPr lang="en-US" dirty="0"/>
+              <a:t> </a:t>
+            </a:r>
+            <a:r>
+              <a:rPr lang="en-US" dirty="0" err="1"/>
+              <a:t>saída</a:t>
+            </a:r>
+            <a:r>
+              <a:rPr lang="en-US" dirty="0"/>
+              <a:t> de string interpolation, e </a:t>
+            </a:r>
+            <a:r>
+              <a:rPr lang="en-US" dirty="0" err="1"/>
+              <a:t>separando</a:t>
+            </a:r>
+            <a:r>
+              <a:rPr lang="en-US" dirty="0"/>
+              <a:t> </a:t>
+            </a:r>
+            <a:r>
+              <a:rPr lang="en-US" dirty="0" err="1"/>
+              <a:t>ele</a:t>
+            </a:r>
+            <a:r>
+              <a:rPr lang="en-US" dirty="0"/>
+              <a:t> </a:t>
+            </a:r>
+            <a:r>
+              <a:rPr lang="en-US" dirty="0" err="1"/>
+              <a:t>em</a:t>
+            </a:r>
+            <a:r>
+              <a:rPr lang="en-US" dirty="0"/>
+              <a:t> </a:t>
+            </a:r>
+            <a:r>
+              <a:rPr lang="en-US" dirty="0" err="1"/>
+              <a:t>uma</a:t>
+            </a:r>
+            <a:r>
+              <a:rPr lang="en-US" dirty="0"/>
+              <a:t> </a:t>
+            </a:r>
+            <a:r>
+              <a:rPr lang="en-US" dirty="0" err="1"/>
+              <a:t>coluna</a:t>
+            </a:r>
+            <a:r>
+              <a:rPr lang="en-US" dirty="0"/>
+              <a:t> de </a:t>
+            </a:r>
+            <a:r>
+              <a:rPr lang="en-US" dirty="0" err="1"/>
+              <a:t>tamanho</a:t>
+            </a:r>
+            <a:r>
+              <a:rPr lang="en-US" dirty="0"/>
+              <a:t> 4.</a:t>
+            </a:r>
+          </a:p>
+          <a:p>
+            <a:pPr marL="342900" indent="-342900">
+              <a:buFont typeface="Arial" panose="020B0604020202020204" pitchFamily="34" charset="0"/>
+              <a:buChar char="•"/>
+            </a:pPr>
+            <a:r>
+              <a:rPr lang="en-US" dirty="0"/>
+              <a:t>Neste input </a:t>
+            </a:r>
+            <a:r>
+              <a:rPr lang="en-US" dirty="0" err="1"/>
+              <a:t>vamos</a:t>
+            </a:r>
+            <a:r>
+              <a:rPr lang="en-US" dirty="0"/>
+              <a:t> </a:t>
+            </a:r>
+            <a:r>
+              <a:rPr lang="en-US" dirty="0" err="1"/>
+              <a:t>utilizar</a:t>
+            </a:r>
+            <a:r>
+              <a:rPr lang="en-US" dirty="0"/>
+              <a:t> o property binding para </a:t>
+            </a:r>
+            <a:r>
+              <a:rPr lang="en-US" dirty="0" err="1"/>
+              <a:t>atribuir</a:t>
+            </a:r>
+            <a:r>
+              <a:rPr lang="en-US" dirty="0"/>
+              <a:t> </a:t>
+            </a:r>
+            <a:r>
+              <a:rPr lang="en-US" dirty="0" err="1"/>
+              <a:t>ao</a:t>
+            </a:r>
+            <a:r>
+              <a:rPr lang="en-US" dirty="0"/>
+              <a:t> value o valor da </a:t>
+            </a:r>
+            <a:r>
+              <a:rPr lang="en-US" dirty="0" err="1"/>
+              <a:t>variavel</a:t>
+            </a:r>
+            <a:r>
+              <a:rPr lang="en-US" dirty="0"/>
+              <a:t> </a:t>
+            </a:r>
+            <a:r>
+              <a:rPr lang="en-US" dirty="0" err="1"/>
+              <a:t>nome</a:t>
+            </a:r>
+            <a:r>
+              <a:rPr lang="en-US" dirty="0"/>
+              <a:t>.</a:t>
+            </a:r>
+          </a:p>
+          <a:p>
+            <a:pPr marL="342900" indent="-342900">
+              <a:buFont typeface="Arial" panose="020B0604020202020204" pitchFamily="34" charset="0"/>
+              <a:buChar char="•"/>
+            </a:pPr>
+            <a:r>
+              <a:rPr lang="en-US" dirty="0"/>
+              <a:t>Desta </a:t>
+            </a:r>
+            <a:r>
+              <a:rPr lang="en-US" dirty="0" err="1"/>
+              <a:t>maneira</a:t>
+            </a:r>
+            <a:r>
+              <a:rPr lang="en-US" dirty="0"/>
+              <a:t> </a:t>
+            </a:r>
+            <a:r>
+              <a:rPr lang="en-US" dirty="0" err="1"/>
+              <a:t>quando</a:t>
+            </a:r>
+            <a:r>
+              <a:rPr lang="en-US" dirty="0"/>
+              <a:t> </a:t>
+            </a:r>
+            <a:r>
+              <a:rPr lang="en-US" dirty="0" err="1"/>
+              <a:t>digitamos</a:t>
+            </a:r>
+            <a:r>
+              <a:rPr lang="en-US" dirty="0"/>
+              <a:t> </a:t>
+            </a:r>
+            <a:r>
+              <a:rPr lang="en-US" dirty="0" err="1"/>
+              <a:t>algo</a:t>
+            </a:r>
+            <a:r>
+              <a:rPr lang="en-US" dirty="0"/>
+              <a:t> no input nada é </a:t>
+            </a:r>
+            <a:r>
+              <a:rPr lang="en-US" dirty="0" err="1"/>
+              <a:t>mostrado</a:t>
+            </a:r>
+            <a:r>
+              <a:rPr lang="en-US" dirty="0"/>
+              <a:t> no </a:t>
+            </a:r>
+            <a:r>
+              <a:rPr lang="en-US" dirty="0" err="1"/>
+              <a:t>nosso</a:t>
+            </a:r>
+            <a:r>
+              <a:rPr lang="en-US" dirty="0"/>
+              <a:t> template.</a:t>
+            </a:r>
+          </a:p>
+        </p:txBody>
+      </p:sp>
+      <p:sp>
+        <p:nvSpPr>
+          <p:cNvPr id="6" name="Title 5"/>
+          <p:cNvSpPr>
+            <a:spLocks noGrp="1"/>
+          </p:cNvSpPr>
+          <p:nvPr>
+            <p:ph type="title"/>
+          </p:nvPr>
+        </p:nvSpPr>
+        <p:spPr/>
+        <p:txBody>
+          <a:bodyPr/>
+          <a:lstStyle/>
+          <a:p>
+            <a:r>
+              <a:rPr lang="en-US" dirty="0" err="1"/>
+              <a:t>Utilizando</a:t>
+            </a:r>
+            <a:r>
+              <a:rPr lang="en-US" dirty="0"/>
+              <a:t> o Two Way Binding</a:t>
+            </a:r>
+            <a:endParaRPr lang="pt-BR" dirty="0"/>
+          </a:p>
+        </p:txBody>
+      </p:sp>
+      <p:pic>
+        <p:nvPicPr>
+          <p:cNvPr id="4" name="Picture 3">
+            <a:extLst>
+              <a:ext uri="{FF2B5EF4-FFF2-40B4-BE49-F238E27FC236}">
+                <a16:creationId xmlns:a16="http://schemas.microsoft.com/office/drawing/2014/main" id="{4A9B1FB6-6BD7-4B61-9B1F-9A27C671EB8B}"/>
+              </a:ext>
+            </a:extLst>
+          </p:cNvPr>
+          <p:cNvPicPr>
+            <a:picLocks noChangeAspect="1"/>
+          </p:cNvPicPr>
+          <p:nvPr/>
+        </p:nvPicPr>
+        <p:blipFill>
+          <a:blip r:embed="rId2"/>
+          <a:stretch>
+            <a:fillRect/>
+          </a:stretch>
+        </p:blipFill>
+        <p:spPr>
+          <a:xfrm>
+            <a:off x="10690123" y="210236"/>
+            <a:ext cx="1359310" cy="1359310"/>
+          </a:xfrm>
+          <a:prstGeom prst="rect">
+            <a:avLst/>
+          </a:prstGeom>
+        </p:spPr>
+      </p:pic>
+    </p:spTree>
+    <p:extLst>
+      <p:ext uri="{BB962C8B-B14F-4D97-AF65-F5344CB8AC3E}">
+        <p14:creationId xmlns:p14="http://schemas.microsoft.com/office/powerpoint/2010/main" val="1688692043"/>
+      </p:ext>
+    </p:extLst>
+  </p:cSld>
+  <p:clrMapOvr>
+    <a:masterClrMapping/>
+  </p:clrMapOvr>
+  <p:transition>
+    <p:fade/>
+  </p:transition>
+</p:sld>
+</file>
+
+<file path=ppt/slides/slide8.xml><?xml version="1.0" encoding="utf-8"?>
+<p:sld xmlns:a="http://schemas.openxmlformats.org/drawingml/2006/main" xmlns:r="http://schemas.openxmlformats.org/officeDocument/2006/relationships" xmlns:p="http://schemas.openxmlformats.org/presentationml/2006/main">
+  <p:cSld>
+    <p:spTree>
+      <p:nvGrpSpPr>
+        <p:cNvPr id="1" name=""/>
+        <p:cNvGrpSpPr/>
+        <p:nvPr/>
+      </p:nvGrpSpPr>
+      <p:grpSpPr>
+        <a:xfrm>
+          <a:off x="0" y="0"/>
+          <a:ext cx="0" cy="0"/>
+          <a:chOff x="0" y="0"/>
+          <a:chExt cx="0" cy="0"/>
+        </a:xfrm>
+      </p:grpSpPr>
+      <p:sp>
+        <p:nvSpPr>
+          <p:cNvPr id="2" name="Slide Number Placeholder 1"/>
+          <p:cNvSpPr>
+            <a:spLocks noGrp="1"/>
+          </p:cNvSpPr>
+          <p:nvPr>
+            <p:ph type="sldNum" sz="quarter" idx="12"/>
+          </p:nvPr>
+        </p:nvSpPr>
+        <p:spPr/>
+        <p:txBody>
+          <a:bodyPr/>
+          <a:lstStyle/>
+          <a:p>
+            <a:fld id="{3847DB54-D037-B84F-B6F1-2E8DA40D09AD}" type="slidenum">
+              <a:rPr lang="en-US" smtClean="0"/>
+              <a:pPr/>
+              <a:t>8</a:t>
+            </a:fld>
+            <a:endParaRPr lang="en-US"/>
+          </a:p>
+        </p:txBody>
+      </p:sp>
+      <p:sp>
+        <p:nvSpPr>
+          <p:cNvPr id="5" name="Content Placeholder 4"/>
+          <p:cNvSpPr>
+            <a:spLocks noGrp="1"/>
+          </p:cNvSpPr>
+          <p:nvPr>
+            <p:ph idx="1"/>
+          </p:nvPr>
+        </p:nvSpPr>
+        <p:spPr/>
+        <p:txBody>
+          <a:bodyPr/>
+          <a:lstStyle/>
+          <a:p>
+            <a:pPr marL="342900" indent="-342900">
+              <a:buFont typeface="Arial" panose="020B0604020202020204" pitchFamily="34" charset="0"/>
+              <a:buChar char="•"/>
+            </a:pPr>
+            <a:r>
+              <a:rPr lang="en-US" dirty="0" err="1"/>
+              <a:t>Ainda</a:t>
+            </a:r>
+            <a:r>
+              <a:rPr lang="en-US" dirty="0"/>
+              <a:t> no input </a:t>
+            </a:r>
+            <a:r>
+              <a:rPr lang="en-US" dirty="0" err="1"/>
+              <a:t>vamos</a:t>
+            </a:r>
+            <a:r>
+              <a:rPr lang="en-US" dirty="0"/>
+              <a:t> </a:t>
+            </a:r>
+            <a:r>
+              <a:rPr lang="en-US" dirty="0" err="1"/>
+              <a:t>criar</a:t>
+            </a:r>
+            <a:r>
+              <a:rPr lang="en-US" dirty="0"/>
+              <a:t> o event binding input que </a:t>
+            </a:r>
+            <a:r>
+              <a:rPr lang="en-US" dirty="0" err="1"/>
+              <a:t>irá</a:t>
+            </a:r>
+            <a:r>
+              <a:rPr lang="en-US" dirty="0"/>
+              <a:t> </a:t>
+            </a:r>
+            <a:r>
+              <a:rPr lang="en-US" dirty="0" err="1"/>
+              <a:t>disparar</a:t>
+            </a:r>
+            <a:r>
+              <a:rPr lang="en-US" dirty="0"/>
+              <a:t> o </a:t>
+            </a:r>
+            <a:r>
+              <a:rPr lang="en-US" dirty="0" err="1"/>
+              <a:t>evento</a:t>
+            </a:r>
+            <a:r>
+              <a:rPr lang="en-US" dirty="0"/>
+              <a:t> </a:t>
+            </a:r>
+            <a:r>
+              <a:rPr lang="en-US" dirty="0" err="1"/>
+              <a:t>atualizaNome</a:t>
+            </a:r>
+            <a:r>
+              <a:rPr lang="en-US" dirty="0"/>
+              <a:t>.</a:t>
+            </a:r>
+          </a:p>
+          <a:p>
+            <a:pPr marL="342900" indent="-342900">
+              <a:buFont typeface="Arial" panose="020B0604020202020204" pitchFamily="34" charset="0"/>
+              <a:buChar char="•"/>
+            </a:pPr>
+            <a:r>
+              <a:rPr lang="en-US" dirty="0"/>
+              <a:t>Agora </a:t>
+            </a:r>
+            <a:r>
+              <a:rPr lang="en-US" dirty="0" err="1"/>
+              <a:t>precisamos</a:t>
+            </a:r>
+            <a:r>
+              <a:rPr lang="en-US" dirty="0"/>
+              <a:t> </a:t>
+            </a:r>
+            <a:r>
+              <a:rPr lang="en-US" dirty="0" err="1"/>
+              <a:t>voltar</a:t>
+            </a:r>
+            <a:r>
+              <a:rPr lang="en-US" dirty="0"/>
+              <a:t> no </a:t>
+            </a:r>
+            <a:r>
+              <a:rPr lang="en-US" dirty="0" err="1"/>
+              <a:t>método</a:t>
+            </a:r>
+            <a:r>
+              <a:rPr lang="en-US" dirty="0"/>
+              <a:t> </a:t>
+            </a:r>
+            <a:r>
+              <a:rPr lang="en-US" dirty="0" err="1"/>
+              <a:t>atualizaNome</a:t>
+            </a:r>
+            <a:r>
+              <a:rPr lang="en-US" dirty="0"/>
+              <a:t> e </a:t>
+            </a:r>
+            <a:r>
+              <a:rPr lang="en-US" dirty="0" err="1"/>
+              <a:t>atribuir</a:t>
+            </a:r>
+            <a:r>
+              <a:rPr lang="en-US" dirty="0"/>
+              <a:t> à </a:t>
+            </a:r>
+            <a:r>
+              <a:rPr lang="en-US" dirty="0" err="1"/>
+              <a:t>variável</a:t>
+            </a:r>
+            <a:r>
+              <a:rPr lang="en-US" dirty="0"/>
+              <a:t> </a:t>
+            </a:r>
+            <a:r>
+              <a:rPr lang="en-US" dirty="0" err="1"/>
+              <a:t>nome</a:t>
+            </a:r>
+            <a:r>
+              <a:rPr lang="en-US" dirty="0"/>
+              <a:t> o novo valor.</a:t>
+            </a:r>
+          </a:p>
+          <a:p>
+            <a:pPr marL="342900" indent="-342900">
+              <a:buFont typeface="Arial" panose="020B0604020202020204" pitchFamily="34" charset="0"/>
+              <a:buChar char="•"/>
+            </a:pPr>
+            <a:r>
+              <a:rPr lang="en-US" dirty="0"/>
+              <a:t>Neste </a:t>
+            </a:r>
+            <a:r>
+              <a:rPr lang="en-US" dirty="0" err="1"/>
+              <a:t>momento</a:t>
+            </a:r>
+            <a:r>
+              <a:rPr lang="en-US" dirty="0"/>
+              <a:t> </a:t>
+            </a:r>
+            <a:r>
+              <a:rPr lang="en-US" dirty="0" err="1"/>
+              <a:t>quando</a:t>
+            </a:r>
+            <a:r>
+              <a:rPr lang="en-US" dirty="0"/>
+              <a:t> </a:t>
+            </a:r>
+            <a:r>
+              <a:rPr lang="en-US" dirty="0" err="1"/>
+              <a:t>digitamos</a:t>
+            </a:r>
+            <a:r>
+              <a:rPr lang="en-US" dirty="0"/>
+              <a:t> o </a:t>
+            </a:r>
+            <a:r>
+              <a:rPr lang="en-US" dirty="0" err="1"/>
+              <a:t>nome</a:t>
+            </a:r>
+            <a:r>
+              <a:rPr lang="en-US" dirty="0"/>
+              <a:t> no input o template </a:t>
+            </a:r>
+            <a:r>
+              <a:rPr lang="en-US" dirty="0" err="1"/>
+              <a:t>também</a:t>
+            </a:r>
+            <a:r>
+              <a:rPr lang="en-US" dirty="0"/>
+              <a:t> é </a:t>
+            </a:r>
+            <a:r>
+              <a:rPr lang="en-US" dirty="0" err="1"/>
+              <a:t>atualizado</a:t>
+            </a:r>
+            <a:r>
+              <a:rPr lang="en-US" dirty="0"/>
+              <a:t>.</a:t>
+            </a:r>
+          </a:p>
+        </p:txBody>
+      </p:sp>
+      <p:sp>
+        <p:nvSpPr>
+          <p:cNvPr id="6" name="Title 5"/>
+          <p:cNvSpPr>
+            <a:spLocks noGrp="1"/>
+          </p:cNvSpPr>
+          <p:nvPr>
+            <p:ph type="title"/>
+          </p:nvPr>
+        </p:nvSpPr>
+        <p:spPr/>
+        <p:txBody>
+          <a:bodyPr/>
+          <a:lstStyle/>
+          <a:p>
+            <a:endParaRPr lang="pt-BR" dirty="0"/>
+          </a:p>
+        </p:txBody>
+      </p:sp>
+      <p:pic>
+        <p:nvPicPr>
+          <p:cNvPr id="4" name="Picture 3">
+            <a:extLst>
+              <a:ext uri="{FF2B5EF4-FFF2-40B4-BE49-F238E27FC236}">
+                <a16:creationId xmlns:a16="http://schemas.microsoft.com/office/drawing/2014/main" id="{4A9B1FB6-6BD7-4B61-9B1F-9A27C671EB8B}"/>
+              </a:ext>
+            </a:extLst>
+          </p:cNvPr>
+          <p:cNvPicPr>
+            <a:picLocks noChangeAspect="1"/>
+          </p:cNvPicPr>
+          <p:nvPr/>
+        </p:nvPicPr>
+        <p:blipFill>
+          <a:blip r:embed="rId2"/>
+          <a:stretch>
+            <a:fillRect/>
+          </a:stretch>
+        </p:blipFill>
+        <p:spPr>
+          <a:xfrm>
+            <a:off x="10690123" y="210236"/>
+            <a:ext cx="1359310" cy="1359310"/>
+          </a:xfrm>
+          <a:prstGeom prst="rect">
+            <a:avLst/>
+          </a:prstGeom>
+        </p:spPr>
+      </p:pic>
+      <p:pic>
+        <p:nvPicPr>
+          <p:cNvPr id="3" name="Picture 2">
+            <a:extLst>
+              <a:ext uri="{FF2B5EF4-FFF2-40B4-BE49-F238E27FC236}">
+                <a16:creationId xmlns:a16="http://schemas.microsoft.com/office/drawing/2014/main" id="{20B8DEEB-AEEF-4205-9843-146A9CFC8B52}"/>
+              </a:ext>
+            </a:extLst>
+          </p:cNvPr>
+          <p:cNvPicPr>
+            <a:picLocks noChangeAspect="1"/>
+          </p:cNvPicPr>
+          <p:nvPr/>
+        </p:nvPicPr>
+        <p:blipFill>
+          <a:blip r:embed="rId3"/>
+          <a:stretch>
+            <a:fillRect/>
+          </a:stretch>
+        </p:blipFill>
+        <p:spPr>
+          <a:xfrm>
+            <a:off x="3827966" y="2831278"/>
+            <a:ext cx="4209906" cy="3178997"/>
+          </a:xfrm>
+          <a:prstGeom prst="rect">
+            <a:avLst/>
+          </a:prstGeom>
+        </p:spPr>
+      </p:pic>
+    </p:spTree>
+    <p:extLst>
+      <p:ext uri="{BB962C8B-B14F-4D97-AF65-F5344CB8AC3E}">
+        <p14:creationId xmlns:p14="http://schemas.microsoft.com/office/powerpoint/2010/main" val="1248813822"/>
+      </p:ext>
+    </p:extLst>
+  </p:cSld>
+  <p:clrMapOvr>
+    <a:masterClrMapping/>
+  </p:clrMapOvr>
+  <p:transition>
+    <p:fade/>
+  </p:transition>
+</p:sld>
+</file>
+
+<file path=ppt/slides/slide9.xml><?xml version="1.0" encoding="utf-8"?>
+<p:sld xmlns:a="http://schemas.openxmlformats.org/drawingml/2006/main" xmlns:r="http://schemas.openxmlformats.org/officeDocument/2006/relationships" xmlns:p="http://schemas.openxmlformats.org/presentationml/2006/main">
+  <p:cSld>
+    <p:spTree>
+      <p:nvGrpSpPr>
+        <p:cNvPr id="1" name=""/>
+        <p:cNvGrpSpPr/>
+        <p:nvPr/>
+      </p:nvGrpSpPr>
+      <p:grpSpPr>
+        <a:xfrm>
+          <a:off x="0" y="0"/>
+          <a:ext cx="0" cy="0"/>
+          <a:chOff x="0" y="0"/>
+          <a:chExt cx="0" cy="0"/>
+        </a:xfrm>
+      </p:grpSpPr>
+      <p:sp>
+        <p:nvSpPr>
+          <p:cNvPr id="2" name="Slide Number Placeholder 1"/>
+          <p:cNvSpPr>
+            <a:spLocks noGrp="1"/>
+          </p:cNvSpPr>
+          <p:nvPr>
+            <p:ph type="sldNum" sz="quarter" idx="12"/>
+          </p:nvPr>
+        </p:nvSpPr>
+        <p:spPr/>
+        <p:txBody>
+          <a:bodyPr/>
+          <a:lstStyle/>
+          <a:p>
+            <a:fld id="{3847DB54-D037-B84F-B6F1-2E8DA40D09AD}" type="slidenum">
+              <a:rPr lang="en-US" smtClean="0"/>
+              <a:pPr/>
+              <a:t>9</a:t>
+            </a:fld>
+            <a:endParaRPr lang="en-US"/>
+          </a:p>
+        </p:txBody>
+      </p:sp>
+      <p:sp>
+        <p:nvSpPr>
+          <p:cNvPr id="5" name="Content Placeholder 4"/>
+          <p:cNvSpPr>
+            <a:spLocks noGrp="1"/>
+          </p:cNvSpPr>
+          <p:nvPr>
+            <p:ph idx="1"/>
+          </p:nvPr>
+        </p:nvSpPr>
+        <p:spPr/>
+        <p:txBody>
+          <a:bodyPr/>
+          <a:lstStyle/>
+          <a:p>
+            <a:pPr marL="342900" indent="-342900">
+              <a:buFont typeface="Arial" panose="020B0604020202020204" pitchFamily="34" charset="0"/>
+              <a:buChar char="•"/>
+            </a:pPr>
+            <a:r>
+              <a:rPr lang="en-US" dirty="0"/>
+              <a:t>No </a:t>
+            </a:r>
+            <a:r>
+              <a:rPr lang="en-US" dirty="0" err="1"/>
+              <a:t>segundo</a:t>
+            </a:r>
+            <a:r>
+              <a:rPr lang="en-US" dirty="0"/>
+              <a:t> </a:t>
+            </a:r>
+            <a:r>
+              <a:rPr lang="en-US" dirty="0" err="1"/>
+              <a:t>exemplo</a:t>
+            </a:r>
+            <a:r>
+              <a:rPr lang="en-US" dirty="0"/>
+              <a:t> </a:t>
+            </a:r>
+            <a:r>
+              <a:rPr lang="en-US" dirty="0" err="1"/>
+              <a:t>utilizando</a:t>
+            </a:r>
+            <a:r>
+              <a:rPr lang="en-US" dirty="0"/>
+              <a:t> o </a:t>
+            </a:r>
+            <a:r>
+              <a:rPr lang="en-US" dirty="0" err="1"/>
+              <a:t>ngModel</a:t>
+            </a:r>
+            <a:r>
+              <a:rPr lang="en-US" dirty="0"/>
+              <a:t> e </a:t>
+            </a:r>
+            <a:r>
+              <a:rPr lang="en-US" dirty="0" err="1"/>
+              <a:t>ngModelChange</a:t>
+            </a:r>
+            <a:r>
+              <a:rPr lang="en-US" dirty="0"/>
+              <a:t>, </a:t>
+            </a:r>
+            <a:r>
+              <a:rPr lang="en-US" dirty="0" err="1"/>
+              <a:t>vamos</a:t>
+            </a:r>
+            <a:r>
+              <a:rPr lang="en-US" dirty="0"/>
+              <a:t> </a:t>
+            </a:r>
+            <a:r>
+              <a:rPr lang="en-US" dirty="0" err="1"/>
+              <a:t>criar</a:t>
+            </a:r>
+            <a:r>
+              <a:rPr lang="en-US" dirty="0"/>
+              <a:t> um </a:t>
+            </a:r>
+            <a:r>
+              <a:rPr lang="en-US" dirty="0" err="1"/>
+              <a:t>componente</a:t>
+            </a:r>
+            <a:r>
+              <a:rPr lang="en-US" dirty="0"/>
+              <a:t> </a:t>
+            </a:r>
+            <a:r>
+              <a:rPr lang="en-US" dirty="0" err="1"/>
+              <a:t>chamado</a:t>
+            </a:r>
+            <a:r>
+              <a:rPr lang="en-US" dirty="0"/>
+              <a:t> </a:t>
+            </a:r>
+            <a:r>
+              <a:rPr lang="en-US" dirty="0" err="1"/>
+              <a:t>segundo</a:t>
+            </a:r>
+            <a:r>
+              <a:rPr lang="en-US" dirty="0"/>
+              <a:t>.</a:t>
+            </a:r>
+          </a:p>
+          <a:p>
+            <a:pPr marL="342900" indent="-342900">
+              <a:buFont typeface="Arial" panose="020B0604020202020204" pitchFamily="34" charset="0"/>
+              <a:buChar char="•"/>
+            </a:pPr>
+            <a:r>
+              <a:rPr lang="en-US" dirty="0"/>
+              <a:t>Na </a:t>
+            </a:r>
+            <a:r>
+              <a:rPr lang="en-US" dirty="0" err="1"/>
+              <a:t>classe</a:t>
+            </a:r>
+            <a:r>
+              <a:rPr lang="en-US" dirty="0"/>
+              <a:t> do </a:t>
+            </a:r>
+            <a:r>
+              <a:rPr lang="en-US" dirty="0" err="1"/>
+              <a:t>componente</a:t>
+            </a:r>
+            <a:r>
+              <a:rPr lang="en-US" dirty="0"/>
+              <a:t> </a:t>
+            </a:r>
+            <a:r>
+              <a:rPr lang="en-US" dirty="0" err="1"/>
+              <a:t>vamos</a:t>
+            </a:r>
+            <a:r>
+              <a:rPr lang="en-US" dirty="0"/>
+              <a:t> </a:t>
+            </a:r>
+            <a:r>
+              <a:rPr lang="en-US" dirty="0" err="1"/>
+              <a:t>criar</a:t>
+            </a:r>
+            <a:r>
+              <a:rPr lang="en-US" dirty="0"/>
+              <a:t> um </a:t>
+            </a:r>
+            <a:r>
+              <a:rPr lang="en-US" dirty="0" err="1"/>
+              <a:t>atributo</a:t>
+            </a:r>
+            <a:r>
+              <a:rPr lang="en-US" dirty="0"/>
+              <a:t> </a:t>
+            </a:r>
+            <a:r>
+              <a:rPr lang="en-US" dirty="0" err="1"/>
+              <a:t>sobrenome</a:t>
+            </a:r>
+            <a:r>
+              <a:rPr lang="en-US" dirty="0"/>
+              <a:t> do </a:t>
+            </a:r>
+            <a:r>
+              <a:rPr lang="en-US" dirty="0" err="1"/>
+              <a:t>tipo</a:t>
+            </a:r>
+            <a:r>
+              <a:rPr lang="en-US" dirty="0"/>
+              <a:t> string.</a:t>
+            </a:r>
+          </a:p>
+          <a:p>
+            <a:pPr marL="342900" indent="-342900">
+              <a:buFont typeface="Arial" panose="020B0604020202020204" pitchFamily="34" charset="0"/>
+              <a:buChar char="•"/>
+            </a:pPr>
+            <a:r>
+              <a:rPr lang="en-US" dirty="0"/>
+              <a:t>Agora no template, </a:t>
+            </a:r>
+            <a:r>
+              <a:rPr lang="en-US" dirty="0" err="1"/>
+              <a:t>vamos</a:t>
+            </a:r>
+            <a:r>
+              <a:rPr lang="en-US" dirty="0"/>
+              <a:t> </a:t>
+            </a:r>
+            <a:r>
+              <a:rPr lang="en-US" dirty="0" err="1"/>
+              <a:t>utilizar</a:t>
+            </a:r>
+            <a:r>
+              <a:rPr lang="en-US" dirty="0"/>
+              <a:t> para </a:t>
+            </a:r>
+            <a:r>
+              <a:rPr lang="en-US" dirty="0" err="1"/>
+              <a:t>estilizar</a:t>
+            </a:r>
+            <a:r>
+              <a:rPr lang="en-US" dirty="0"/>
+              <a:t> o fluid jumbotron do bootstrap, </a:t>
+            </a:r>
+            <a:r>
+              <a:rPr lang="en-US" dirty="0" err="1"/>
+              <a:t>como</a:t>
+            </a:r>
+            <a:r>
+              <a:rPr lang="en-US" dirty="0"/>
+              <a:t> </a:t>
+            </a:r>
+            <a:r>
+              <a:rPr lang="en-US" dirty="0" err="1"/>
+              <a:t>feito</a:t>
+            </a:r>
+            <a:r>
+              <a:rPr lang="en-US" dirty="0"/>
+              <a:t> no </a:t>
+            </a:r>
+            <a:r>
+              <a:rPr lang="en-US" dirty="0" err="1"/>
+              <a:t>exemplo</a:t>
+            </a:r>
+            <a:r>
+              <a:rPr lang="en-US" dirty="0"/>
+              <a:t> anterior.</a:t>
+            </a:r>
+          </a:p>
+          <a:p>
+            <a:pPr marL="342900" indent="-342900">
+              <a:buFont typeface="Arial" panose="020B0604020202020204" pitchFamily="34" charset="0"/>
+              <a:buChar char="•"/>
+            </a:pPr>
+            <a:r>
+              <a:rPr lang="en-US" dirty="0"/>
+              <a:t>Neste input </a:t>
+            </a:r>
+            <a:r>
+              <a:rPr lang="en-US" dirty="0" err="1"/>
+              <a:t>vamos</a:t>
+            </a:r>
+            <a:r>
+              <a:rPr lang="en-US" dirty="0"/>
+              <a:t> </a:t>
+            </a:r>
+            <a:r>
+              <a:rPr lang="en-US" dirty="0" err="1"/>
+              <a:t>utilizar</a:t>
+            </a:r>
+            <a:r>
+              <a:rPr lang="en-US" dirty="0"/>
+              <a:t> o </a:t>
+            </a:r>
+            <a:r>
+              <a:rPr lang="en-US" dirty="0" err="1"/>
+              <a:t>ngModel</a:t>
+            </a:r>
+            <a:r>
+              <a:rPr lang="en-US" dirty="0"/>
+              <a:t> para </a:t>
+            </a:r>
+            <a:r>
+              <a:rPr lang="en-US" dirty="0" err="1"/>
+              <a:t>atribuir</a:t>
+            </a:r>
+            <a:r>
+              <a:rPr lang="en-US" dirty="0"/>
+              <a:t> </a:t>
+            </a:r>
+            <a:r>
+              <a:rPr lang="en-US" dirty="0" err="1"/>
+              <a:t>ao</a:t>
+            </a:r>
+            <a:r>
+              <a:rPr lang="en-US" dirty="0"/>
+              <a:t> value o valor da </a:t>
+            </a:r>
+            <a:r>
+              <a:rPr lang="en-US" dirty="0" err="1"/>
+              <a:t>variavel</a:t>
+            </a:r>
+            <a:r>
+              <a:rPr lang="en-US" dirty="0"/>
+              <a:t> </a:t>
+            </a:r>
+            <a:r>
+              <a:rPr lang="en-US" dirty="0" err="1"/>
+              <a:t>sobrenome</a:t>
+            </a:r>
+            <a:r>
+              <a:rPr lang="en-US" dirty="0"/>
+              <a:t>.</a:t>
+            </a:r>
+          </a:p>
+          <a:p>
+            <a:pPr marL="342900" indent="-342900">
+              <a:buFont typeface="Arial" panose="020B0604020202020204" pitchFamily="34" charset="0"/>
+              <a:buChar char="•"/>
+            </a:pPr>
+            <a:r>
+              <a:rPr lang="en-US" dirty="0"/>
+              <a:t>Desta </a:t>
+            </a:r>
+            <a:r>
+              <a:rPr lang="en-US" dirty="0" err="1"/>
+              <a:t>maneira</a:t>
+            </a:r>
+            <a:r>
+              <a:rPr lang="en-US" dirty="0"/>
+              <a:t> </a:t>
+            </a:r>
+            <a:r>
+              <a:rPr lang="en-US" dirty="0" err="1"/>
+              <a:t>quando</a:t>
+            </a:r>
+            <a:r>
+              <a:rPr lang="en-US" dirty="0"/>
+              <a:t> </a:t>
+            </a:r>
+            <a:r>
+              <a:rPr lang="en-US" dirty="0" err="1"/>
+              <a:t>digitamos</a:t>
+            </a:r>
+            <a:r>
+              <a:rPr lang="en-US" dirty="0"/>
+              <a:t> </a:t>
+            </a:r>
+            <a:r>
+              <a:rPr lang="en-US" dirty="0" err="1"/>
+              <a:t>algo</a:t>
+            </a:r>
+            <a:r>
+              <a:rPr lang="en-US" dirty="0"/>
+              <a:t> no input nada é </a:t>
+            </a:r>
+            <a:r>
+              <a:rPr lang="en-US" dirty="0" err="1"/>
+              <a:t>mostrado</a:t>
+            </a:r>
+            <a:r>
+              <a:rPr lang="en-US" dirty="0"/>
+              <a:t> no </a:t>
+            </a:r>
+            <a:r>
+              <a:rPr lang="en-US" dirty="0" err="1"/>
+              <a:t>nosso</a:t>
+            </a:r>
+            <a:r>
+              <a:rPr lang="en-US" dirty="0"/>
+              <a:t> template.</a:t>
+            </a:r>
+          </a:p>
+          <a:p>
+            <a:pPr marL="342900" indent="-342900">
+              <a:buFont typeface="Arial" panose="020B0604020202020204" pitchFamily="34" charset="0"/>
+              <a:buChar char="•"/>
+            </a:pPr>
+            <a:r>
+              <a:rPr lang="en-US" dirty="0"/>
+              <a:t>No input </a:t>
+            </a:r>
+            <a:r>
+              <a:rPr lang="en-US" dirty="0" err="1"/>
+              <a:t>vamos</a:t>
+            </a:r>
+            <a:r>
+              <a:rPr lang="en-US" dirty="0"/>
+              <a:t> </a:t>
+            </a:r>
+            <a:r>
+              <a:rPr lang="en-US" dirty="0" err="1"/>
+              <a:t>criar</a:t>
+            </a:r>
+            <a:r>
+              <a:rPr lang="en-US" dirty="0"/>
+              <a:t> o </a:t>
+            </a:r>
+            <a:r>
+              <a:rPr lang="en-US" dirty="0" err="1"/>
+              <a:t>ngModelChange</a:t>
+            </a:r>
+            <a:r>
+              <a:rPr lang="en-US" dirty="0"/>
+              <a:t>  que </a:t>
+            </a:r>
+            <a:r>
+              <a:rPr lang="en-US" dirty="0" err="1"/>
+              <a:t>irá</a:t>
+            </a:r>
+            <a:r>
+              <a:rPr lang="en-US" dirty="0"/>
+              <a:t> </a:t>
+            </a:r>
+            <a:r>
+              <a:rPr lang="en-US" dirty="0" err="1"/>
+              <a:t>atualizar</a:t>
+            </a:r>
+            <a:r>
+              <a:rPr lang="en-US" dirty="0"/>
+              <a:t> o </a:t>
+            </a:r>
+            <a:r>
+              <a:rPr lang="en-US" dirty="0" err="1"/>
+              <a:t>sobrenome</a:t>
+            </a:r>
+            <a:r>
+              <a:rPr lang="en-US" dirty="0"/>
+              <a:t>.</a:t>
+            </a:r>
+          </a:p>
+          <a:p>
+            <a:pPr marL="342900" indent="-342900">
+              <a:buFont typeface="Arial" panose="020B0604020202020204" pitchFamily="34" charset="0"/>
+              <a:buChar char="•"/>
+            </a:pPr>
+            <a:r>
+              <a:rPr lang="en-US" dirty="0"/>
+              <a:t>Neste </a:t>
+            </a:r>
+            <a:r>
+              <a:rPr lang="en-US" dirty="0" err="1"/>
+              <a:t>momento</a:t>
+            </a:r>
+            <a:r>
+              <a:rPr lang="en-US" dirty="0"/>
+              <a:t> </a:t>
+            </a:r>
+            <a:r>
+              <a:rPr lang="en-US" dirty="0" err="1"/>
+              <a:t>quando</a:t>
+            </a:r>
+            <a:r>
+              <a:rPr lang="en-US" dirty="0"/>
+              <a:t> </a:t>
+            </a:r>
+            <a:r>
+              <a:rPr lang="en-US" dirty="0" err="1"/>
+              <a:t>digitamos</a:t>
+            </a:r>
+            <a:r>
+              <a:rPr lang="en-US" dirty="0"/>
+              <a:t> o </a:t>
+            </a:r>
+            <a:r>
+              <a:rPr lang="en-US" dirty="0" err="1"/>
+              <a:t>sobrenome</a:t>
+            </a:r>
+            <a:r>
+              <a:rPr lang="en-US" dirty="0"/>
+              <a:t> no input o template </a:t>
+            </a:r>
+            <a:r>
+              <a:rPr lang="en-US" dirty="0" err="1"/>
+              <a:t>também</a:t>
+            </a:r>
+            <a:r>
+              <a:rPr lang="en-US" dirty="0"/>
+              <a:t> é </a:t>
+            </a:r>
+            <a:r>
+              <a:rPr lang="en-US" dirty="0" err="1"/>
+              <a:t>atualizado</a:t>
+            </a:r>
+            <a:r>
+              <a:rPr lang="en-US" dirty="0"/>
+              <a:t>.</a:t>
+            </a:r>
+          </a:p>
+        </p:txBody>
+      </p:sp>
+      <p:sp>
+        <p:nvSpPr>
+          <p:cNvPr id="6" name="Title 5"/>
+          <p:cNvSpPr>
+            <a:spLocks noGrp="1"/>
+          </p:cNvSpPr>
+          <p:nvPr>
+            <p:ph type="title"/>
+          </p:nvPr>
+        </p:nvSpPr>
+        <p:spPr/>
+        <p:txBody>
+          <a:bodyPr/>
+          <a:lstStyle/>
+          <a:p>
+            <a:endParaRPr lang="pt-BR" dirty="0"/>
+          </a:p>
+        </p:txBody>
+      </p:sp>
+      <p:pic>
+        <p:nvPicPr>
+          <p:cNvPr id="4" name="Picture 3">
+            <a:extLst>
+              <a:ext uri="{FF2B5EF4-FFF2-40B4-BE49-F238E27FC236}">
+                <a16:creationId xmlns:a16="http://schemas.microsoft.com/office/drawing/2014/main" id="{4A9B1FB6-6BD7-4B61-9B1F-9A27C671EB8B}"/>
+              </a:ext>
+            </a:extLst>
+          </p:cNvPr>
+          <p:cNvPicPr>
+            <a:picLocks noChangeAspect="1"/>
+          </p:cNvPicPr>
+          <p:nvPr/>
+        </p:nvPicPr>
+        <p:blipFill>
+          <a:blip r:embed="rId2"/>
+          <a:stretch>
+            <a:fillRect/>
+          </a:stretch>
+        </p:blipFill>
+        <p:spPr>
+          <a:xfrm>
+            <a:off x="10690123" y="210236"/>
+            <a:ext cx="1359310" cy="1359310"/>
+          </a:xfrm>
+          <a:prstGeom prst="rect">
+            <a:avLst/>
+          </a:prstGeom>
+        </p:spPr>
+      </p:pic>
+    </p:spTree>
+    <p:extLst>
+      <p:ext uri="{BB962C8B-B14F-4D97-AF65-F5344CB8AC3E}">
+        <p14:creationId xmlns:p14="http://schemas.microsoft.com/office/powerpoint/2010/main" val="3297230038"/>
       </p:ext>
     </p:extLst>
   </p:cSld>
@@ -9440,18 +13467,18 @@
 </file>
 
 <file path=customXml/item2.xml><?xml version="1.0" encoding="utf-8"?>
-<p:properties xmlns:p="http://schemas.microsoft.com/office/2006/metadata/properties" xmlns:xsi="http://www.w3.org/2001/XMLSchema-instance" xmlns:pc="http://schemas.microsoft.com/office/infopath/2007/PartnerControls">
-  <documentManagement/>
-</p:properties>
-</file>
-
-<file path=customXml/item3.xml><?xml version="1.0" encoding="utf-8"?>
 <?mso-contentType ?>
 <FormTemplates xmlns="http://schemas.microsoft.com/sharepoint/v3/contenttype/forms">
   <Display>DocumentLibraryForm</Display>
   <Edit>DocumentLibraryForm</Edit>
   <New>DocumentLibraryForm</New>
 </FormTemplates>
+</file>
+
+<file path=customXml/item3.xml><?xml version="1.0" encoding="utf-8"?>
+<p:properties xmlns:p="http://schemas.microsoft.com/office/2006/metadata/properties" xmlns:xsi="http://www.w3.org/2001/XMLSchema-instance" xmlns:pc="http://schemas.microsoft.com/office/infopath/2007/PartnerControls">
+  <documentManagement/>
+</p:properties>
 </file>
 
 <file path=customXml/itemProps1.xml><?xml version="1.0" encoding="utf-8"?>
@@ -9473,25 +13500,25 @@
 </file>
 
 <file path=customXml/itemProps2.xml><?xml version="1.0" encoding="utf-8"?>
-<ds:datastoreItem xmlns:ds="http://schemas.openxmlformats.org/officeDocument/2006/customXml" ds:itemID="{840916AD-EA36-4B19-B020-346B3B08ACE2}">
+<ds:datastoreItem xmlns:ds="http://schemas.openxmlformats.org/officeDocument/2006/customXml" ds:itemID="{CFC7BE12-D282-45D2-9360-ABE4B1901808}">
   <ds:schemaRefs>
-    <ds:schemaRef ds:uri="http://purl.org/dc/terms/"/>
-    <ds:schemaRef ds:uri="07a316ae-5687-4ea8-90ab-e5c6f194d564"/>
-    <ds:schemaRef ds:uri="http://schemas.microsoft.com/office/2006/documentManagement/types"/>
-    <ds:schemaRef ds:uri="http://schemas.microsoft.com/office/infopath/2007/PartnerControls"/>
-    <ds:schemaRef ds:uri="http://purl.org/dc/elements/1.1/"/>
-    <ds:schemaRef ds:uri="http://schemas.microsoft.com/office/2006/metadata/properties"/>
-    <ds:schemaRef ds:uri="http://schemas.openxmlformats.org/package/2006/metadata/core-properties"/>
-    <ds:schemaRef ds:uri="http://www.w3.org/XML/1998/namespace"/>
-    <ds:schemaRef ds:uri="http://purl.org/dc/dcmitype/"/>
+    <ds:schemaRef ds:uri="http://schemas.microsoft.com/sharepoint/v3/contenttype/forms"/>
   </ds:schemaRefs>
 </ds:datastoreItem>
 </file>
 
 <file path=customXml/itemProps3.xml><?xml version="1.0" encoding="utf-8"?>
-<ds:datastoreItem xmlns:ds="http://schemas.openxmlformats.org/officeDocument/2006/customXml" ds:itemID="{CFC7BE12-D282-45D2-9360-ABE4B1901808}">
+<ds:datastoreItem xmlns:ds="http://schemas.openxmlformats.org/officeDocument/2006/customXml" ds:itemID="{840916AD-EA36-4B19-B020-346B3B08ACE2}">
   <ds:schemaRefs>
-    <ds:schemaRef ds:uri="http://schemas.microsoft.com/sharepoint/v3/contenttype/forms"/>
+    <ds:schemaRef ds:uri="http://purl.org/dc/elements/1.1/"/>
+    <ds:schemaRef ds:uri="http://schemas.microsoft.com/office/2006/metadata/properties"/>
+    <ds:schemaRef ds:uri="http://purl.org/dc/terms/"/>
+    <ds:schemaRef ds:uri="http://schemas.microsoft.com/office/2006/documentManagement/types"/>
+    <ds:schemaRef ds:uri="http://purl.org/dc/dcmitype/"/>
+    <ds:schemaRef ds:uri="http://schemas.microsoft.com/office/infopath/2007/PartnerControls"/>
+    <ds:schemaRef ds:uri="http://schemas.openxmlformats.org/package/2006/metadata/core-properties"/>
+    <ds:schemaRef ds:uri="07a316ae-5687-4ea8-90ab-e5c6f194d564"/>
+    <ds:schemaRef ds:uri="http://www.w3.org/XML/1998/namespace"/>
   </ds:schemaRefs>
 </ds:datastoreItem>
 </file>
</xml_diff>